<commit_message>
Updating globe, experiment and teams pages
</commit_message>
<xml_diff>
--- a/extras/database_design.pptx
+++ b/extras/database_design.pptx
@@ -5,18 +5,20 @@
     <p:sldMasterId id="2147483648" r:id="rId1"/>
   </p:sldMasterIdLst>
   <p:notesMasterIdLst>
-    <p:notesMasterId r:id="rId11"/>
+    <p:notesMasterId r:id="rId13"/>
   </p:notesMasterIdLst>
   <p:sldIdLst>
     <p:sldId id="256" r:id="rId2"/>
-    <p:sldId id="298" r:id="rId3"/>
-    <p:sldId id="258" r:id="rId4"/>
-    <p:sldId id="259" r:id="rId5"/>
-    <p:sldId id="293" r:id="rId6"/>
-    <p:sldId id="297" r:id="rId7"/>
-    <p:sldId id="257" r:id="rId8"/>
-    <p:sldId id="260" r:id="rId9"/>
-    <p:sldId id="261" r:id="rId10"/>
+    <p:sldId id="299" r:id="rId3"/>
+    <p:sldId id="300" r:id="rId4"/>
+    <p:sldId id="298" r:id="rId5"/>
+    <p:sldId id="258" r:id="rId6"/>
+    <p:sldId id="259" r:id="rId7"/>
+    <p:sldId id="293" r:id="rId8"/>
+    <p:sldId id="297" r:id="rId9"/>
+    <p:sldId id="257" r:id="rId10"/>
+    <p:sldId id="260" r:id="rId11"/>
+    <p:sldId id="261" r:id="rId12"/>
   </p:sldIdLst>
   <p:sldSz cx="12192000" cy="6858000"/>
   <p:notesSz cx="6858000" cy="9144000"/>
@@ -5341,7 +5343,7 @@
           <a:p>
             <a:fld id="{0A98017F-DEEE-492C-8955-A6E29E749704}" type="datetimeFigureOut">
               <a:rPr lang="en-US" smtClean="0"/>
-              <a:t>2/24/2023</a:t>
+              <a:t>6/4/2023</a:t>
             </a:fld>
             <a:endParaRPr lang="en-US"/>
           </a:p>
@@ -5999,7 +6001,7 @@
           <a:p>
             <a:fld id="{40E057E4-528E-473F-A17C-509F31BC4320}" type="datetimeFigureOut">
               <a:rPr lang="en-US" smtClean="0"/>
-              <a:t>2/24/2023</a:t>
+              <a:t>6/4/2023</a:t>
             </a:fld>
             <a:endParaRPr lang="en-US"/>
           </a:p>
@@ -6197,7 +6199,7 @@
           <a:p>
             <a:fld id="{40E057E4-528E-473F-A17C-509F31BC4320}" type="datetimeFigureOut">
               <a:rPr lang="en-US" smtClean="0"/>
-              <a:t>2/24/2023</a:t>
+              <a:t>6/4/2023</a:t>
             </a:fld>
             <a:endParaRPr lang="en-US"/>
           </a:p>
@@ -6405,7 +6407,7 @@
           <a:p>
             <a:fld id="{40E057E4-528E-473F-A17C-509F31BC4320}" type="datetimeFigureOut">
               <a:rPr lang="en-US" smtClean="0"/>
-              <a:t>2/24/2023</a:t>
+              <a:t>6/4/2023</a:t>
             </a:fld>
             <a:endParaRPr lang="en-US"/>
           </a:p>
@@ -6782,7 +6784,7 @@
             <a:fld id="{9B7EE7B1-A6C1-4E39-8665-A73ED03F32E1}" type="datetimeFigureOut">
               <a:rPr lang="en-US" smtClean="0"/>
               <a:pPr/>
-              <a:t>2/24/2023</a:t>
+              <a:t>6/4/2023</a:t>
             </a:fld>
             <a:endParaRPr lang="en-US" dirty="0"/>
           </a:p>
@@ -7011,7 +7013,7 @@
           <a:p>
             <a:fld id="{40E057E4-528E-473F-A17C-509F31BC4320}" type="datetimeFigureOut">
               <a:rPr lang="en-US" smtClean="0"/>
-              <a:t>2/24/2023</a:t>
+              <a:t>6/4/2023</a:t>
             </a:fld>
             <a:endParaRPr lang="en-US"/>
           </a:p>
@@ -7286,7 +7288,7 @@
           <a:p>
             <a:fld id="{40E057E4-528E-473F-A17C-509F31BC4320}" type="datetimeFigureOut">
               <a:rPr lang="en-US" smtClean="0"/>
-              <a:t>2/24/2023</a:t>
+              <a:t>6/4/2023</a:t>
             </a:fld>
             <a:endParaRPr lang="en-US"/>
           </a:p>
@@ -7551,7 +7553,7 @@
           <a:p>
             <a:fld id="{40E057E4-528E-473F-A17C-509F31BC4320}" type="datetimeFigureOut">
               <a:rPr lang="en-US" smtClean="0"/>
-              <a:t>2/24/2023</a:t>
+              <a:t>6/4/2023</a:t>
             </a:fld>
             <a:endParaRPr lang="en-US"/>
           </a:p>
@@ -7963,7 +7965,7 @@
           <a:p>
             <a:fld id="{40E057E4-528E-473F-A17C-509F31BC4320}" type="datetimeFigureOut">
               <a:rPr lang="en-US" smtClean="0"/>
-              <a:t>2/24/2023</a:t>
+              <a:t>6/4/2023</a:t>
             </a:fld>
             <a:endParaRPr lang="en-US"/>
           </a:p>
@@ -8104,7 +8106,7 @@
           <a:p>
             <a:fld id="{40E057E4-528E-473F-A17C-509F31BC4320}" type="datetimeFigureOut">
               <a:rPr lang="en-US" smtClean="0"/>
-              <a:t>2/24/2023</a:t>
+              <a:t>6/4/2023</a:t>
             </a:fld>
             <a:endParaRPr lang="en-US"/>
           </a:p>
@@ -8217,7 +8219,7 @@
           <a:p>
             <a:fld id="{40E057E4-528E-473F-A17C-509F31BC4320}" type="datetimeFigureOut">
               <a:rPr lang="en-US" smtClean="0"/>
-              <a:t>2/24/2023</a:t>
+              <a:t>6/4/2023</a:t>
             </a:fld>
             <a:endParaRPr lang="en-US"/>
           </a:p>
@@ -8528,7 +8530,7 @@
           <a:p>
             <a:fld id="{40E057E4-528E-473F-A17C-509F31BC4320}" type="datetimeFigureOut">
               <a:rPr lang="en-US" smtClean="0"/>
-              <a:t>2/24/2023</a:t>
+              <a:t>6/4/2023</a:t>
             </a:fld>
             <a:endParaRPr lang="en-US"/>
           </a:p>
@@ -8816,7 +8818,7 @@
           <a:p>
             <a:fld id="{40E057E4-528E-473F-A17C-509F31BC4320}" type="datetimeFigureOut">
               <a:rPr lang="en-US" smtClean="0"/>
-              <a:t>2/24/2023</a:t>
+              <a:t>6/4/2023</a:t>
             </a:fld>
             <a:endParaRPr lang="en-US"/>
           </a:p>
@@ -9057,7 +9059,7 @@
           <a:p>
             <a:fld id="{40E057E4-528E-473F-A17C-509F31BC4320}" type="datetimeFigureOut">
               <a:rPr lang="en-US" smtClean="0"/>
-              <a:t>2/24/2023</a:t>
+              <a:t>6/4/2023</a:t>
             </a:fld>
             <a:endParaRPr lang="en-US"/>
           </a:p>
@@ -9544,7 +9546,1622 @@
 </p:sld>
 </file>
 
+<file path=ppt/slides/slide10.xml><?xml version="1.0" encoding="utf-8"?>
+<p:sld xmlns:a="http://schemas.openxmlformats.org/drawingml/2006/main" xmlns:r="http://schemas.openxmlformats.org/officeDocument/2006/relationships" xmlns:p="http://schemas.openxmlformats.org/presentationml/2006/main">
+  <p:cSld>
+    <p:spTree>
+      <p:nvGrpSpPr>
+        <p:cNvPr id="1" name=""/>
+        <p:cNvGrpSpPr/>
+        <p:nvPr/>
+      </p:nvGrpSpPr>
+      <p:grpSpPr>
+        <a:xfrm>
+          <a:off x="0" y="0"/>
+          <a:ext cx="0" cy="0"/>
+          <a:chOff x="0" y="0"/>
+          <a:chExt cx="0" cy="0"/>
+        </a:xfrm>
+      </p:grpSpPr>
+      <p:sp>
+        <p:nvSpPr>
+          <p:cNvPr id="2" name="Title 1">
+            <a:extLst>
+              <a:ext uri="{FF2B5EF4-FFF2-40B4-BE49-F238E27FC236}">
+                <a16:creationId xmlns:a16="http://schemas.microsoft.com/office/drawing/2014/main" id="{F591C7DA-F06F-3612-2787-A8CBAA9DD492}"/>
+              </a:ext>
+            </a:extLst>
+          </p:cNvPr>
+          <p:cNvSpPr>
+            <a:spLocks noGrp="1"/>
+          </p:cNvSpPr>
+          <p:nvPr>
+            <p:ph type="title"/>
+          </p:nvPr>
+        </p:nvSpPr>
+        <p:spPr/>
+        <p:txBody>
+          <a:bodyPr/>
+          <a:lstStyle/>
+          <a:p>
+            <a:r>
+              <a:rPr lang="en-US" dirty="0"/>
+              <a:t>1. Entity Diagram, 2. Relationships, 3. Identify Access Patterns</a:t>
+            </a:r>
+          </a:p>
+        </p:txBody>
+      </p:sp>
+      <p:sp>
+        <p:nvSpPr>
+          <p:cNvPr id="4" name="Rectangle: Rounded Corners 3">
+            <a:extLst>
+              <a:ext uri="{FF2B5EF4-FFF2-40B4-BE49-F238E27FC236}">
+                <a16:creationId xmlns:a16="http://schemas.microsoft.com/office/drawing/2014/main" id="{D020F353-FD85-9C9D-C783-0D3DCB9D5334}"/>
+              </a:ext>
+            </a:extLst>
+          </p:cNvPr>
+          <p:cNvSpPr/>
+          <p:nvPr/>
+        </p:nvSpPr>
+        <p:spPr>
+          <a:xfrm>
+            <a:off x="297407" y="2435739"/>
+            <a:ext cx="2386083" cy="1325563"/>
+          </a:xfrm>
+          <a:prstGeom prst="roundRect">
+            <a:avLst/>
+          </a:prstGeom>
+        </p:spPr>
+        <p:style>
+          <a:lnRef idx="2">
+            <a:schemeClr val="accent1">
+              <a:shade val="50000"/>
+            </a:schemeClr>
+          </a:lnRef>
+          <a:fillRef idx="1">
+            <a:schemeClr val="accent1"/>
+          </a:fillRef>
+          <a:effectRef idx="0">
+            <a:schemeClr val="accent1"/>
+          </a:effectRef>
+          <a:fontRef idx="minor">
+            <a:schemeClr val="lt1"/>
+          </a:fontRef>
+        </p:style>
+        <p:txBody>
+          <a:bodyPr rtlCol="0" anchor="ctr"/>
+          <a:lstStyle/>
+          <a:p>
+            <a:pPr algn="ctr"/>
+            <a:r>
+              <a:rPr lang="en-US" dirty="0"/>
+              <a:t>Region</a:t>
+            </a:r>
+          </a:p>
+          <a:p>
+            <a:pPr marL="285750" indent="-285750" algn="ctr">
+              <a:buFontTx/>
+              <a:buChar char="-"/>
+            </a:pPr>
+            <a:r>
+              <a:rPr lang="en-US" dirty="0" err="1"/>
+              <a:t>reg_id</a:t>
+            </a:r>
+            <a:endParaRPr lang="en-US" dirty="0"/>
+          </a:p>
+          <a:p>
+            <a:pPr marL="285750" indent="-285750" algn="ctr">
+              <a:buFontTx/>
+              <a:buChar char="-"/>
+            </a:pPr>
+            <a:r>
+              <a:rPr lang="en-US" dirty="0"/>
+              <a:t>name</a:t>
+            </a:r>
+          </a:p>
+          <a:p>
+            <a:pPr marL="285750" indent="-285750" algn="ctr">
+              <a:buFontTx/>
+              <a:buChar char="-"/>
+            </a:pPr>
+            <a:r>
+              <a:rPr lang="en-US" dirty="0"/>
+              <a:t>type</a:t>
+            </a:r>
+          </a:p>
+        </p:txBody>
+      </p:sp>
+      <p:sp>
+        <p:nvSpPr>
+          <p:cNvPr id="5" name="Rectangle: Rounded Corners 4">
+            <a:extLst>
+              <a:ext uri="{FF2B5EF4-FFF2-40B4-BE49-F238E27FC236}">
+                <a16:creationId xmlns:a16="http://schemas.microsoft.com/office/drawing/2014/main" id="{E0A18936-4DD6-7F5F-941B-3BF2C44C06AA}"/>
+              </a:ext>
+            </a:extLst>
+          </p:cNvPr>
+          <p:cNvSpPr/>
+          <p:nvPr/>
+        </p:nvSpPr>
+        <p:spPr>
+          <a:xfrm>
+            <a:off x="3085527" y="1775012"/>
+            <a:ext cx="2386083" cy="2571113"/>
+          </a:xfrm>
+          <a:prstGeom prst="roundRect">
+            <a:avLst/>
+          </a:prstGeom>
+        </p:spPr>
+        <p:style>
+          <a:lnRef idx="2">
+            <a:schemeClr val="accent1">
+              <a:shade val="50000"/>
+            </a:schemeClr>
+          </a:lnRef>
+          <a:fillRef idx="1">
+            <a:schemeClr val="accent1"/>
+          </a:fillRef>
+          <a:effectRef idx="0">
+            <a:schemeClr val="accent1"/>
+          </a:effectRef>
+          <a:fontRef idx="minor">
+            <a:schemeClr val="lt1"/>
+          </a:fontRef>
+        </p:style>
+        <p:txBody>
+          <a:bodyPr rtlCol="0" anchor="ctr"/>
+          <a:lstStyle/>
+          <a:p>
+            <a:pPr algn="ctr"/>
+            <a:r>
+              <a:rPr lang="en-US" dirty="0"/>
+              <a:t>Scenario</a:t>
+            </a:r>
+          </a:p>
+          <a:p>
+            <a:pPr marL="285750" indent="-285750" algn="ctr">
+              <a:buFontTx/>
+              <a:buChar char="-"/>
+            </a:pPr>
+            <a:r>
+              <a:rPr lang="en-US" dirty="0" err="1"/>
+              <a:t>scen_id</a:t>
+            </a:r>
+            <a:endParaRPr lang="en-US" dirty="0"/>
+          </a:p>
+          <a:p>
+            <a:pPr marL="285750" indent="-285750" algn="ctr">
+              <a:buFontTx/>
+              <a:buChar char="-"/>
+            </a:pPr>
+            <a:r>
+              <a:rPr lang="en-US" dirty="0"/>
+              <a:t>name</a:t>
+            </a:r>
+          </a:p>
+          <a:p>
+            <a:pPr marL="285750" indent="-285750" algn="ctr">
+              <a:buFontTx/>
+              <a:buChar char="-"/>
+            </a:pPr>
+            <a:r>
+              <a:rPr lang="en-US" dirty="0"/>
+              <a:t>type</a:t>
+            </a:r>
+          </a:p>
+          <a:p>
+            <a:pPr marL="285750" indent="-285750" algn="ctr">
+              <a:buFontTx/>
+              <a:buChar char="-"/>
+            </a:pPr>
+            <a:r>
+              <a:rPr lang="en-US" dirty="0" err="1"/>
+              <a:t>scen_ref</a:t>
+            </a:r>
+            <a:endParaRPr lang="en-US" dirty="0"/>
+          </a:p>
+          <a:p>
+            <a:pPr marL="285750" indent="-285750" algn="ctr">
+              <a:buFontTx/>
+              <a:buChar char="-"/>
+            </a:pPr>
+            <a:r>
+              <a:rPr lang="en-US" dirty="0" err="1"/>
+              <a:t>scen_diff</a:t>
+            </a:r>
+            <a:endParaRPr lang="en-US" dirty="0"/>
+          </a:p>
+          <a:p>
+            <a:pPr marL="285750" indent="-285750" algn="ctr">
+              <a:buFontTx/>
+              <a:buChar char="-"/>
+            </a:pPr>
+            <a:r>
+              <a:rPr lang="en-US" dirty="0"/>
+              <a:t>year</a:t>
+            </a:r>
+          </a:p>
+        </p:txBody>
+      </p:sp>
+      <p:sp>
+        <p:nvSpPr>
+          <p:cNvPr id="7" name="Rectangle: Rounded Corners 6">
+            <a:extLst>
+              <a:ext uri="{FF2B5EF4-FFF2-40B4-BE49-F238E27FC236}">
+                <a16:creationId xmlns:a16="http://schemas.microsoft.com/office/drawing/2014/main" id="{E21567AC-4944-BB0B-F88E-F49D2873C887}"/>
+              </a:ext>
+            </a:extLst>
+          </p:cNvPr>
+          <p:cNvSpPr/>
+          <p:nvPr/>
+        </p:nvSpPr>
+        <p:spPr>
+          <a:xfrm>
+            <a:off x="7793183" y="2435738"/>
+            <a:ext cx="1810651" cy="1325563"/>
+          </a:xfrm>
+          <a:prstGeom prst="roundRect">
+            <a:avLst/>
+          </a:prstGeom>
+        </p:spPr>
+        <p:style>
+          <a:lnRef idx="2">
+            <a:schemeClr val="accent1">
+              <a:shade val="50000"/>
+            </a:schemeClr>
+          </a:lnRef>
+          <a:fillRef idx="1">
+            <a:schemeClr val="accent1"/>
+          </a:fillRef>
+          <a:effectRef idx="0">
+            <a:schemeClr val="accent1"/>
+          </a:effectRef>
+          <a:fontRef idx="minor">
+            <a:schemeClr val="lt1"/>
+          </a:fontRef>
+        </p:style>
+        <p:txBody>
+          <a:bodyPr rtlCol="0" anchor="ctr"/>
+          <a:lstStyle/>
+          <a:p>
+            <a:pPr algn="ctr"/>
+            <a:r>
+              <a:rPr lang="en-US" dirty="0"/>
+              <a:t>Class1</a:t>
+            </a:r>
+          </a:p>
+          <a:p>
+            <a:pPr algn="ctr"/>
+            <a:r>
+              <a:rPr lang="en-US" dirty="0"/>
+              <a:t>- class1_id</a:t>
+            </a:r>
+          </a:p>
+          <a:p>
+            <a:pPr marL="285750" indent="-285750" algn="ctr">
+              <a:buFontTx/>
+              <a:buChar char="-"/>
+            </a:pPr>
+            <a:r>
+              <a:rPr lang="en-US" dirty="0"/>
+              <a:t>Name</a:t>
+            </a:r>
+          </a:p>
+          <a:p>
+            <a:pPr marL="285750" indent="-285750" algn="ctr">
+              <a:buFontTx/>
+              <a:buChar char="-"/>
+            </a:pPr>
+            <a:r>
+              <a:rPr lang="en-US" dirty="0"/>
+              <a:t>value</a:t>
+            </a:r>
+          </a:p>
+        </p:txBody>
+      </p:sp>
+      <p:sp>
+        <p:nvSpPr>
+          <p:cNvPr id="8" name="Rectangle: Rounded Corners 7">
+            <a:extLst>
+              <a:ext uri="{FF2B5EF4-FFF2-40B4-BE49-F238E27FC236}">
+                <a16:creationId xmlns:a16="http://schemas.microsoft.com/office/drawing/2014/main" id="{DDA4B277-1F3D-1CD1-87F9-D9D7AC58EF3F}"/>
+              </a:ext>
+            </a:extLst>
+          </p:cNvPr>
+          <p:cNvSpPr/>
+          <p:nvPr/>
+        </p:nvSpPr>
+        <p:spPr>
+          <a:xfrm>
+            <a:off x="10241159" y="2439490"/>
+            <a:ext cx="1810651" cy="1325563"/>
+          </a:xfrm>
+          <a:prstGeom prst="roundRect">
+            <a:avLst/>
+          </a:prstGeom>
+        </p:spPr>
+        <p:style>
+          <a:lnRef idx="2">
+            <a:schemeClr val="accent1">
+              <a:shade val="50000"/>
+            </a:schemeClr>
+          </a:lnRef>
+          <a:fillRef idx="1">
+            <a:schemeClr val="accent1"/>
+          </a:fillRef>
+          <a:effectRef idx="0">
+            <a:schemeClr val="accent1"/>
+          </a:effectRef>
+          <a:fontRef idx="minor">
+            <a:schemeClr val="lt1"/>
+          </a:fontRef>
+        </p:style>
+        <p:txBody>
+          <a:bodyPr rtlCol="0" anchor="ctr"/>
+          <a:lstStyle/>
+          <a:p>
+            <a:pPr algn="ctr"/>
+            <a:r>
+              <a:rPr lang="en-US" dirty="0"/>
+              <a:t>Class2</a:t>
+            </a:r>
+          </a:p>
+          <a:p>
+            <a:pPr algn="ctr"/>
+            <a:r>
+              <a:rPr lang="en-US" dirty="0"/>
+              <a:t>- class2_id </a:t>
+            </a:r>
+          </a:p>
+          <a:p>
+            <a:pPr marL="285750" indent="-285750" algn="ctr">
+              <a:buFontTx/>
+              <a:buChar char="-"/>
+            </a:pPr>
+            <a:r>
+              <a:rPr lang="en-US" dirty="0"/>
+              <a:t>Name</a:t>
+            </a:r>
+          </a:p>
+          <a:p>
+            <a:pPr marL="285750" indent="-285750" algn="ctr">
+              <a:buFontTx/>
+              <a:buChar char="-"/>
+            </a:pPr>
+            <a:r>
+              <a:rPr lang="en-US" dirty="0"/>
+              <a:t>value</a:t>
+            </a:r>
+          </a:p>
+        </p:txBody>
+      </p:sp>
+      <p:cxnSp>
+        <p:nvCxnSpPr>
+          <p:cNvPr id="10" name="Straight Connector 9">
+            <a:extLst>
+              <a:ext uri="{FF2B5EF4-FFF2-40B4-BE49-F238E27FC236}">
+                <a16:creationId xmlns:a16="http://schemas.microsoft.com/office/drawing/2014/main" id="{1F208BF0-F55D-C89F-7F8F-50998EB1F1A7}"/>
+              </a:ext>
+            </a:extLst>
+          </p:cNvPr>
+          <p:cNvCxnSpPr>
+            <a:cxnSpLocks/>
+            <a:stCxn id="4" idx="3"/>
+            <a:endCxn id="5" idx="1"/>
+          </p:cNvCxnSpPr>
+          <p:nvPr/>
+        </p:nvCxnSpPr>
+        <p:spPr>
+          <a:xfrm flipV="1">
+            <a:off x="2683490" y="3060569"/>
+            <a:ext cx="402037" cy="37952"/>
+          </a:xfrm>
+          <a:prstGeom prst="line">
+            <a:avLst/>
+          </a:prstGeom>
+          <a:ln w="12700"/>
+        </p:spPr>
+        <p:style>
+          <a:lnRef idx="1">
+            <a:schemeClr val="accent1"/>
+          </a:lnRef>
+          <a:fillRef idx="0">
+            <a:schemeClr val="accent1"/>
+          </a:fillRef>
+          <a:effectRef idx="0">
+            <a:schemeClr val="accent1"/>
+          </a:effectRef>
+          <a:fontRef idx="minor">
+            <a:schemeClr val="tx1"/>
+          </a:fontRef>
+        </p:style>
+      </p:cxnSp>
+      <p:cxnSp>
+        <p:nvCxnSpPr>
+          <p:cNvPr id="11" name="Straight Connector 10">
+            <a:extLst>
+              <a:ext uri="{FF2B5EF4-FFF2-40B4-BE49-F238E27FC236}">
+                <a16:creationId xmlns:a16="http://schemas.microsoft.com/office/drawing/2014/main" id="{4D1F0218-6995-45A1-AF6A-429F3757BB0F}"/>
+              </a:ext>
+            </a:extLst>
+          </p:cNvPr>
+          <p:cNvCxnSpPr>
+            <a:cxnSpLocks/>
+            <a:stCxn id="4" idx="3"/>
+            <a:endCxn id="5" idx="2"/>
+          </p:cNvCxnSpPr>
+          <p:nvPr/>
+        </p:nvCxnSpPr>
+        <p:spPr>
+          <a:xfrm>
+            <a:off x="2683490" y="3098521"/>
+            <a:ext cx="1595079" cy="1247604"/>
+          </a:xfrm>
+          <a:prstGeom prst="line">
+            <a:avLst/>
+          </a:prstGeom>
+          <a:ln w="12700"/>
+        </p:spPr>
+        <p:style>
+          <a:lnRef idx="1">
+            <a:schemeClr val="accent1"/>
+          </a:lnRef>
+          <a:fillRef idx="0">
+            <a:schemeClr val="accent1"/>
+          </a:fillRef>
+          <a:effectRef idx="0">
+            <a:schemeClr val="accent1"/>
+          </a:effectRef>
+          <a:fontRef idx="minor">
+            <a:schemeClr val="tx1"/>
+          </a:fontRef>
+        </p:style>
+      </p:cxnSp>
+      <p:cxnSp>
+        <p:nvCxnSpPr>
+          <p:cNvPr id="14" name="Straight Connector 13">
+            <a:extLst>
+              <a:ext uri="{FF2B5EF4-FFF2-40B4-BE49-F238E27FC236}">
+                <a16:creationId xmlns:a16="http://schemas.microsoft.com/office/drawing/2014/main" id="{9CBF70A8-2867-3E8F-3A8C-E6791732DFE7}"/>
+              </a:ext>
+            </a:extLst>
+          </p:cNvPr>
+          <p:cNvCxnSpPr>
+            <a:cxnSpLocks/>
+            <a:stCxn id="4" idx="3"/>
+            <a:endCxn id="5" idx="0"/>
+          </p:cNvCxnSpPr>
+          <p:nvPr/>
+        </p:nvCxnSpPr>
+        <p:spPr>
+          <a:xfrm flipV="1">
+            <a:off x="2683490" y="1775012"/>
+            <a:ext cx="1595079" cy="1323509"/>
+          </a:xfrm>
+          <a:prstGeom prst="line">
+            <a:avLst/>
+          </a:prstGeom>
+          <a:ln w="12700"/>
+        </p:spPr>
+        <p:style>
+          <a:lnRef idx="1">
+            <a:schemeClr val="accent1"/>
+          </a:lnRef>
+          <a:fillRef idx="0">
+            <a:schemeClr val="accent1"/>
+          </a:fillRef>
+          <a:effectRef idx="0">
+            <a:schemeClr val="accent1"/>
+          </a:effectRef>
+          <a:fontRef idx="minor">
+            <a:schemeClr val="tx1"/>
+          </a:fontRef>
+        </p:style>
+      </p:cxnSp>
+      <p:cxnSp>
+        <p:nvCxnSpPr>
+          <p:cNvPr id="40" name="Straight Connector 39">
+            <a:extLst>
+              <a:ext uri="{FF2B5EF4-FFF2-40B4-BE49-F238E27FC236}">
+                <a16:creationId xmlns:a16="http://schemas.microsoft.com/office/drawing/2014/main" id="{FE1F722A-A2D8-9718-34AB-665795EAFAB2}"/>
+              </a:ext>
+            </a:extLst>
+          </p:cNvPr>
+          <p:cNvCxnSpPr>
+            <a:cxnSpLocks/>
+            <a:stCxn id="5" idx="3"/>
+            <a:endCxn id="7" idx="1"/>
+          </p:cNvCxnSpPr>
+          <p:nvPr/>
+        </p:nvCxnSpPr>
+        <p:spPr>
+          <a:xfrm>
+            <a:off x="5471610" y="3060569"/>
+            <a:ext cx="2321573" cy="37951"/>
+          </a:xfrm>
+          <a:prstGeom prst="line">
+            <a:avLst/>
+          </a:prstGeom>
+          <a:ln w="12700"/>
+        </p:spPr>
+        <p:style>
+          <a:lnRef idx="1">
+            <a:schemeClr val="accent1"/>
+          </a:lnRef>
+          <a:fillRef idx="0">
+            <a:schemeClr val="accent1"/>
+          </a:fillRef>
+          <a:effectRef idx="0">
+            <a:schemeClr val="accent1"/>
+          </a:effectRef>
+          <a:fontRef idx="minor">
+            <a:schemeClr val="tx1"/>
+          </a:fontRef>
+        </p:style>
+      </p:cxnSp>
+      <p:cxnSp>
+        <p:nvCxnSpPr>
+          <p:cNvPr id="41" name="Straight Connector 40">
+            <a:extLst>
+              <a:ext uri="{FF2B5EF4-FFF2-40B4-BE49-F238E27FC236}">
+                <a16:creationId xmlns:a16="http://schemas.microsoft.com/office/drawing/2014/main" id="{485277DF-3C8C-A532-E6D5-CFEA9A48A6D1}"/>
+              </a:ext>
+            </a:extLst>
+          </p:cNvPr>
+          <p:cNvCxnSpPr>
+            <a:cxnSpLocks/>
+            <a:stCxn id="5" idx="3"/>
+            <a:endCxn id="7" idx="2"/>
+          </p:cNvCxnSpPr>
+          <p:nvPr/>
+        </p:nvCxnSpPr>
+        <p:spPr>
+          <a:xfrm>
+            <a:off x="5471610" y="3060569"/>
+            <a:ext cx="3226899" cy="700732"/>
+          </a:xfrm>
+          <a:prstGeom prst="line">
+            <a:avLst/>
+          </a:prstGeom>
+          <a:ln w="12700"/>
+        </p:spPr>
+        <p:style>
+          <a:lnRef idx="1">
+            <a:schemeClr val="accent1"/>
+          </a:lnRef>
+          <a:fillRef idx="0">
+            <a:schemeClr val="accent1"/>
+          </a:fillRef>
+          <a:effectRef idx="0">
+            <a:schemeClr val="accent1"/>
+          </a:effectRef>
+          <a:fontRef idx="minor">
+            <a:schemeClr val="tx1"/>
+          </a:fontRef>
+        </p:style>
+      </p:cxnSp>
+      <p:cxnSp>
+        <p:nvCxnSpPr>
+          <p:cNvPr id="42" name="Straight Connector 41">
+            <a:extLst>
+              <a:ext uri="{FF2B5EF4-FFF2-40B4-BE49-F238E27FC236}">
+                <a16:creationId xmlns:a16="http://schemas.microsoft.com/office/drawing/2014/main" id="{F75FE0CB-BE1E-7146-AC17-2ABB4282EB1E}"/>
+              </a:ext>
+            </a:extLst>
+          </p:cNvPr>
+          <p:cNvCxnSpPr>
+            <a:cxnSpLocks/>
+            <a:stCxn id="5" idx="3"/>
+            <a:endCxn id="7" idx="0"/>
+          </p:cNvCxnSpPr>
+          <p:nvPr/>
+        </p:nvCxnSpPr>
+        <p:spPr>
+          <a:xfrm flipV="1">
+            <a:off x="5471610" y="2435738"/>
+            <a:ext cx="3226899" cy="624831"/>
+          </a:xfrm>
+          <a:prstGeom prst="line">
+            <a:avLst/>
+          </a:prstGeom>
+          <a:ln w="12700"/>
+        </p:spPr>
+        <p:style>
+          <a:lnRef idx="1">
+            <a:schemeClr val="accent1"/>
+          </a:lnRef>
+          <a:fillRef idx="0">
+            <a:schemeClr val="accent1"/>
+          </a:fillRef>
+          <a:effectRef idx="0">
+            <a:schemeClr val="accent1"/>
+          </a:effectRef>
+          <a:fontRef idx="minor">
+            <a:schemeClr val="tx1"/>
+          </a:fontRef>
+        </p:style>
+      </p:cxnSp>
+      <p:cxnSp>
+        <p:nvCxnSpPr>
+          <p:cNvPr id="55" name="Straight Connector 54">
+            <a:extLst>
+              <a:ext uri="{FF2B5EF4-FFF2-40B4-BE49-F238E27FC236}">
+                <a16:creationId xmlns:a16="http://schemas.microsoft.com/office/drawing/2014/main" id="{B3B79EAB-4220-2207-138A-39B92D2B8779}"/>
+              </a:ext>
+            </a:extLst>
+          </p:cNvPr>
+          <p:cNvCxnSpPr>
+            <a:cxnSpLocks/>
+            <a:stCxn id="7" idx="3"/>
+            <a:endCxn id="8" idx="0"/>
+          </p:cNvCxnSpPr>
+          <p:nvPr/>
+        </p:nvCxnSpPr>
+        <p:spPr>
+          <a:xfrm flipV="1">
+            <a:off x="9603834" y="2439490"/>
+            <a:ext cx="1542651" cy="659030"/>
+          </a:xfrm>
+          <a:prstGeom prst="line">
+            <a:avLst/>
+          </a:prstGeom>
+          <a:ln w="12700"/>
+        </p:spPr>
+        <p:style>
+          <a:lnRef idx="1">
+            <a:schemeClr val="accent1"/>
+          </a:lnRef>
+          <a:fillRef idx="0">
+            <a:schemeClr val="accent1"/>
+          </a:fillRef>
+          <a:effectRef idx="0">
+            <a:schemeClr val="accent1"/>
+          </a:effectRef>
+          <a:fontRef idx="minor">
+            <a:schemeClr val="tx1"/>
+          </a:fontRef>
+        </p:style>
+      </p:cxnSp>
+      <p:cxnSp>
+        <p:nvCxnSpPr>
+          <p:cNvPr id="56" name="Straight Connector 55">
+            <a:extLst>
+              <a:ext uri="{FF2B5EF4-FFF2-40B4-BE49-F238E27FC236}">
+                <a16:creationId xmlns:a16="http://schemas.microsoft.com/office/drawing/2014/main" id="{54F62048-F68E-54E7-481A-A3885A3D0CFF}"/>
+              </a:ext>
+            </a:extLst>
+          </p:cNvPr>
+          <p:cNvCxnSpPr>
+            <a:cxnSpLocks/>
+            <a:stCxn id="7" idx="3"/>
+            <a:endCxn id="8" idx="1"/>
+          </p:cNvCxnSpPr>
+          <p:nvPr/>
+        </p:nvCxnSpPr>
+        <p:spPr>
+          <a:xfrm>
+            <a:off x="9603834" y="3098520"/>
+            <a:ext cx="637325" cy="3752"/>
+          </a:xfrm>
+          <a:prstGeom prst="line">
+            <a:avLst/>
+          </a:prstGeom>
+          <a:ln w="12700"/>
+        </p:spPr>
+        <p:style>
+          <a:lnRef idx="1">
+            <a:schemeClr val="accent1"/>
+          </a:lnRef>
+          <a:fillRef idx="0">
+            <a:schemeClr val="accent1"/>
+          </a:fillRef>
+          <a:effectRef idx="0">
+            <a:schemeClr val="accent1"/>
+          </a:effectRef>
+          <a:fontRef idx="minor">
+            <a:schemeClr val="tx1"/>
+          </a:fontRef>
+        </p:style>
+      </p:cxnSp>
+      <p:cxnSp>
+        <p:nvCxnSpPr>
+          <p:cNvPr id="57" name="Straight Connector 56">
+            <a:extLst>
+              <a:ext uri="{FF2B5EF4-FFF2-40B4-BE49-F238E27FC236}">
+                <a16:creationId xmlns:a16="http://schemas.microsoft.com/office/drawing/2014/main" id="{6A54BF1D-9BBE-70D0-F7E6-F08A75116FB9}"/>
+              </a:ext>
+            </a:extLst>
+          </p:cNvPr>
+          <p:cNvCxnSpPr>
+            <a:cxnSpLocks/>
+            <a:stCxn id="7" idx="3"/>
+            <a:endCxn id="8" idx="2"/>
+          </p:cNvCxnSpPr>
+          <p:nvPr/>
+        </p:nvCxnSpPr>
+        <p:spPr>
+          <a:xfrm>
+            <a:off x="9603834" y="3098520"/>
+            <a:ext cx="1542651" cy="666533"/>
+          </a:xfrm>
+          <a:prstGeom prst="line">
+            <a:avLst/>
+          </a:prstGeom>
+          <a:ln w="12700"/>
+        </p:spPr>
+        <p:style>
+          <a:lnRef idx="1">
+            <a:schemeClr val="accent1"/>
+          </a:lnRef>
+          <a:fillRef idx="0">
+            <a:schemeClr val="accent1"/>
+          </a:fillRef>
+          <a:effectRef idx="0">
+            <a:schemeClr val="accent1"/>
+          </a:effectRef>
+          <a:fontRef idx="minor">
+            <a:schemeClr val="tx1"/>
+          </a:fontRef>
+        </p:style>
+      </p:cxnSp>
+      <p:sp>
+        <p:nvSpPr>
+          <p:cNvPr id="17" name="Rectangle: Rounded Corners 16">
+            <a:extLst>
+              <a:ext uri="{FF2B5EF4-FFF2-40B4-BE49-F238E27FC236}">
+                <a16:creationId xmlns:a16="http://schemas.microsoft.com/office/drawing/2014/main" id="{3CC6EFB5-86E0-78BC-C8A5-6D5F219AEBA1}"/>
+              </a:ext>
+            </a:extLst>
+          </p:cNvPr>
+          <p:cNvSpPr/>
+          <p:nvPr/>
+        </p:nvSpPr>
+        <p:spPr>
+          <a:xfrm>
+            <a:off x="222524" y="4581382"/>
+            <a:ext cx="2535848" cy="1631033"/>
+          </a:xfrm>
+          <a:prstGeom prst="roundRect">
+            <a:avLst/>
+          </a:prstGeom>
+        </p:spPr>
+        <p:style>
+          <a:lnRef idx="2">
+            <a:schemeClr val="accent3"/>
+          </a:lnRef>
+          <a:fillRef idx="1">
+            <a:schemeClr val="lt1"/>
+          </a:fillRef>
+          <a:effectRef idx="0">
+            <a:schemeClr val="accent3"/>
+          </a:effectRef>
+          <a:fontRef idx="minor">
+            <a:schemeClr val="dk1"/>
+          </a:fontRef>
+        </p:style>
+        <p:txBody>
+          <a:bodyPr rtlCol="0" anchor="ctr"/>
+          <a:lstStyle/>
+          <a:p>
+            <a:pPr marL="285750" indent="-285750">
+              <a:buFont typeface="Arial" panose="020B0604020202020204" pitchFamily="34" charset="0"/>
+              <a:buChar char="•"/>
+            </a:pPr>
+            <a:r>
+              <a:rPr lang="en-US" sz="1600" dirty="0"/>
+              <a:t>Find a region by name</a:t>
+            </a:r>
+          </a:p>
+          <a:p>
+            <a:pPr marL="285750" indent="-285750">
+              <a:buFont typeface="Arial" panose="020B0604020202020204" pitchFamily="34" charset="0"/>
+              <a:buChar char="•"/>
+            </a:pPr>
+            <a:r>
+              <a:rPr lang="en-US" sz="1600" dirty="0"/>
+              <a:t>Find a region by type</a:t>
+            </a:r>
+          </a:p>
+          <a:p>
+            <a:pPr marL="285750" indent="-285750">
+              <a:buFont typeface="Arial" panose="020B0604020202020204" pitchFamily="34" charset="0"/>
+              <a:buChar char="•"/>
+            </a:pPr>
+            <a:r>
+              <a:rPr lang="en-US" sz="1600" dirty="0"/>
+              <a:t>Find all scenarios</a:t>
+            </a:r>
+          </a:p>
+          <a:p>
+            <a:pPr marL="285750" indent="-285750">
+              <a:buFont typeface="Arial" panose="020B0604020202020204" pitchFamily="34" charset="0"/>
+              <a:buChar char="•"/>
+            </a:pPr>
+            <a:r>
+              <a:rPr lang="en-US" sz="1600" dirty="0"/>
+              <a:t>Find all class 1</a:t>
+            </a:r>
+          </a:p>
+          <a:p>
+            <a:pPr marL="285750" indent="-285750">
+              <a:buFont typeface="Arial" panose="020B0604020202020204" pitchFamily="34" charset="0"/>
+              <a:buChar char="•"/>
+            </a:pPr>
+            <a:r>
+              <a:rPr lang="en-US" sz="1600" dirty="0"/>
+              <a:t>Find all class 2</a:t>
+            </a:r>
+          </a:p>
+        </p:txBody>
+      </p:sp>
+      <p:sp>
+        <p:nvSpPr>
+          <p:cNvPr id="18" name="Rectangle: Rounded Corners 17">
+            <a:extLst>
+              <a:ext uri="{FF2B5EF4-FFF2-40B4-BE49-F238E27FC236}">
+                <a16:creationId xmlns:a16="http://schemas.microsoft.com/office/drawing/2014/main" id="{AFDF7C67-DF7A-7335-2873-6F4F55C7B3DD}"/>
+              </a:ext>
+            </a:extLst>
+          </p:cNvPr>
+          <p:cNvSpPr/>
+          <p:nvPr/>
+        </p:nvSpPr>
+        <p:spPr>
+          <a:xfrm>
+            <a:off x="3085527" y="4773096"/>
+            <a:ext cx="2386083" cy="1247604"/>
+          </a:xfrm>
+          <a:prstGeom prst="roundRect">
+            <a:avLst/>
+          </a:prstGeom>
+        </p:spPr>
+        <p:style>
+          <a:lnRef idx="2">
+            <a:schemeClr val="accent3"/>
+          </a:lnRef>
+          <a:fillRef idx="1">
+            <a:schemeClr val="lt1"/>
+          </a:fillRef>
+          <a:effectRef idx="0">
+            <a:schemeClr val="accent3"/>
+          </a:effectRef>
+          <a:fontRef idx="minor">
+            <a:schemeClr val="dk1"/>
+          </a:fontRef>
+        </p:style>
+        <p:txBody>
+          <a:bodyPr rtlCol="0" anchor="ctr"/>
+          <a:lstStyle/>
+          <a:p>
+            <a:pPr marL="285750" indent="-285750">
+              <a:buFont typeface="Arial" panose="020B0604020202020204" pitchFamily="34" charset="0"/>
+              <a:buChar char="•"/>
+            </a:pPr>
+            <a:r>
+              <a:rPr lang="en-US" sz="1600" dirty="0"/>
+              <a:t>Find all scenarios</a:t>
+            </a:r>
+          </a:p>
+          <a:p>
+            <a:pPr marL="285750" indent="-285750">
+              <a:buFont typeface="Arial" panose="020B0604020202020204" pitchFamily="34" charset="0"/>
+              <a:buChar char="•"/>
+            </a:pPr>
+            <a:r>
+              <a:rPr lang="en-US" sz="1600" dirty="0"/>
+              <a:t>Find all params</a:t>
+            </a:r>
+          </a:p>
+          <a:p>
+            <a:pPr marL="285750" indent="-285750">
+              <a:buFont typeface="Arial" panose="020B0604020202020204" pitchFamily="34" charset="0"/>
+              <a:buChar char="•"/>
+            </a:pPr>
+            <a:r>
+              <a:rPr lang="en-US" sz="1600" dirty="0"/>
+              <a:t>Find all class 2</a:t>
+            </a:r>
+          </a:p>
+        </p:txBody>
+      </p:sp>
+      <p:sp>
+        <p:nvSpPr>
+          <p:cNvPr id="37" name="Rectangle: Rounded Corners 36">
+            <a:extLst>
+              <a:ext uri="{FF2B5EF4-FFF2-40B4-BE49-F238E27FC236}">
+                <a16:creationId xmlns:a16="http://schemas.microsoft.com/office/drawing/2014/main" id="{1BE9E735-2CF3-08EB-91DE-79DB9BE326A6}"/>
+              </a:ext>
+            </a:extLst>
+          </p:cNvPr>
+          <p:cNvSpPr/>
+          <p:nvPr/>
+        </p:nvSpPr>
+        <p:spPr>
+          <a:xfrm>
+            <a:off x="5778544" y="2322458"/>
+            <a:ext cx="1810651" cy="1514171"/>
+          </a:xfrm>
+          <a:prstGeom prst="roundRect">
+            <a:avLst/>
+          </a:prstGeom>
+        </p:spPr>
+        <p:style>
+          <a:lnRef idx="2">
+            <a:schemeClr val="accent1">
+              <a:shade val="50000"/>
+            </a:schemeClr>
+          </a:lnRef>
+          <a:fillRef idx="1">
+            <a:schemeClr val="accent1"/>
+          </a:fillRef>
+          <a:effectRef idx="0">
+            <a:schemeClr val="accent1"/>
+          </a:effectRef>
+          <a:fontRef idx="minor">
+            <a:schemeClr val="lt1"/>
+          </a:fontRef>
+        </p:style>
+        <p:txBody>
+          <a:bodyPr rtlCol="0" anchor="ctr"/>
+          <a:lstStyle/>
+          <a:p>
+            <a:pPr algn="ctr"/>
+            <a:r>
+              <a:rPr lang="en-US" dirty="0"/>
+              <a:t>Param</a:t>
+            </a:r>
+          </a:p>
+          <a:p>
+            <a:pPr algn="ctr"/>
+            <a:r>
+              <a:rPr lang="en-US" dirty="0"/>
+              <a:t>- </a:t>
+            </a:r>
+            <a:r>
+              <a:rPr lang="en-US" dirty="0" err="1"/>
+              <a:t>param_id</a:t>
+            </a:r>
+            <a:endParaRPr lang="en-US" dirty="0"/>
+          </a:p>
+          <a:p>
+            <a:pPr marL="285750" indent="-285750" algn="ctr">
+              <a:buFontTx/>
+              <a:buChar char="-"/>
+            </a:pPr>
+            <a:r>
+              <a:rPr lang="en-US" dirty="0"/>
+              <a:t>Name</a:t>
+            </a:r>
+          </a:p>
+          <a:p>
+            <a:pPr marL="285750" indent="-285750" algn="ctr">
+              <a:buFontTx/>
+              <a:buChar char="-"/>
+            </a:pPr>
+            <a:r>
+              <a:rPr lang="en-US" dirty="0"/>
+              <a:t>Units</a:t>
+            </a:r>
+          </a:p>
+          <a:p>
+            <a:pPr marL="285750" indent="-285750" algn="ctr">
+              <a:buFontTx/>
+              <a:buChar char="-"/>
+            </a:pPr>
+            <a:r>
+              <a:rPr lang="en-US" dirty="0"/>
+              <a:t>value</a:t>
+            </a:r>
+          </a:p>
+        </p:txBody>
+      </p:sp>
+    </p:spTree>
+    <p:extLst>
+      <p:ext uri="{BB962C8B-B14F-4D97-AF65-F5344CB8AC3E}">
+        <p14:creationId xmlns:p14="http://schemas.microsoft.com/office/powerpoint/2010/main" val="3690257771"/>
+      </p:ext>
+    </p:extLst>
+  </p:cSld>
+  <p:clrMapOvr>
+    <a:masterClrMapping/>
+  </p:clrMapOvr>
+</p:sld>
+</file>
+
+<file path=ppt/slides/slide11.xml><?xml version="1.0" encoding="utf-8"?>
+<p:sld xmlns:a="http://schemas.openxmlformats.org/drawingml/2006/main" xmlns:r="http://schemas.openxmlformats.org/officeDocument/2006/relationships" xmlns:p="http://schemas.openxmlformats.org/presentationml/2006/main">
+  <p:cSld>
+    <p:spTree>
+      <p:nvGrpSpPr>
+        <p:cNvPr id="1" name=""/>
+        <p:cNvGrpSpPr/>
+        <p:nvPr/>
+      </p:nvGrpSpPr>
+      <p:grpSpPr>
+        <a:xfrm>
+          <a:off x="0" y="0"/>
+          <a:ext cx="0" cy="0"/>
+          <a:chOff x="0" y="0"/>
+          <a:chExt cx="0" cy="0"/>
+        </a:xfrm>
+      </p:grpSpPr>
+      <p:sp>
+        <p:nvSpPr>
+          <p:cNvPr id="2" name="Title 1">
+            <a:extLst>
+              <a:ext uri="{FF2B5EF4-FFF2-40B4-BE49-F238E27FC236}">
+                <a16:creationId xmlns:a16="http://schemas.microsoft.com/office/drawing/2014/main" id="{2C2320FF-FB20-7AC2-5593-F6B8081422F3}"/>
+              </a:ext>
+            </a:extLst>
+          </p:cNvPr>
+          <p:cNvSpPr>
+            <a:spLocks noGrp="1"/>
+          </p:cNvSpPr>
+          <p:nvPr>
+            <p:ph type="title"/>
+          </p:nvPr>
+        </p:nvSpPr>
+        <p:spPr/>
+        <p:txBody>
+          <a:bodyPr/>
+          <a:lstStyle/>
+          <a:p>
+            <a:r>
+              <a:rPr lang="en-US" dirty="0"/>
+              <a:t>4 Primary Key</a:t>
+            </a:r>
+          </a:p>
+        </p:txBody>
+      </p:sp>
+      <p:graphicFrame>
+        <p:nvGraphicFramePr>
+          <p:cNvPr id="4" name="Table 16">
+            <a:extLst>
+              <a:ext uri="{FF2B5EF4-FFF2-40B4-BE49-F238E27FC236}">
+                <a16:creationId xmlns:a16="http://schemas.microsoft.com/office/drawing/2014/main" id="{B1C6CC05-9377-C30D-C153-70828B044B97}"/>
+              </a:ext>
+            </a:extLst>
+          </p:cNvPr>
+          <p:cNvGraphicFramePr>
+            <a:graphicFrameLocks noGrp="1"/>
+          </p:cNvGraphicFramePr>
+          <p:nvPr>
+            <p:extLst>
+              <p:ext uri="{D42A27DB-BD31-4B8C-83A1-F6EECF244321}">
+                <p14:modId xmlns:p14="http://schemas.microsoft.com/office/powerpoint/2010/main" val="3367607023"/>
+              </p:ext>
+            </p:extLst>
+          </p:nvPr>
+        </p:nvGraphicFramePr>
+        <p:xfrm>
+          <a:off x="1975029" y="2220123"/>
+          <a:ext cx="7951752" cy="3661836"/>
+        </p:xfrm>
+        <a:graphic>
+          <a:graphicData uri="http://schemas.openxmlformats.org/drawingml/2006/table">
+            <a:tbl>
+              <a:tblPr firstRow="1" bandRow="1">
+                <a:tableStyleId>{5C22544A-7EE6-4342-B048-85BDC9FD1C3A}</a:tableStyleId>
+              </a:tblPr>
+              <a:tblGrid>
+                <a:gridCol w="2650584">
+                  <a:extLst>
+                    <a:ext uri="{9D8B030D-6E8A-4147-A177-3AD203B41FA5}">
+                      <a16:colId xmlns:a16="http://schemas.microsoft.com/office/drawing/2014/main" val="1558971779"/>
+                    </a:ext>
+                  </a:extLst>
+                </a:gridCol>
+                <a:gridCol w="2650584">
+                  <a:extLst>
+                    <a:ext uri="{9D8B030D-6E8A-4147-A177-3AD203B41FA5}">
+                      <a16:colId xmlns:a16="http://schemas.microsoft.com/office/drawing/2014/main" val="2800269369"/>
+                    </a:ext>
+                  </a:extLst>
+                </a:gridCol>
+                <a:gridCol w="2650584">
+                  <a:extLst>
+                    <a:ext uri="{9D8B030D-6E8A-4147-A177-3AD203B41FA5}">
+                      <a16:colId xmlns:a16="http://schemas.microsoft.com/office/drawing/2014/main" val="997523949"/>
+                    </a:ext>
+                  </a:extLst>
+                </a:gridCol>
+              </a:tblGrid>
+              <a:tr h="610306">
+                <a:tc>
+                  <a:txBody>
+                    <a:bodyPr/>
+                    <a:lstStyle/>
+                    <a:p>
+                      <a:r>
+                        <a:rPr lang="en-US" dirty="0"/>
+                        <a:t>Entity</a:t>
+                      </a:r>
+                    </a:p>
+                  </a:txBody>
+                  <a:tcPr/>
+                </a:tc>
+                <a:tc>
+                  <a:txBody>
+                    <a:bodyPr/>
+                    <a:lstStyle/>
+                    <a:p>
+                      <a:r>
+                        <a:rPr lang="en-US" dirty="0"/>
+                        <a:t>Partition Key (PK)</a:t>
+                      </a:r>
+                    </a:p>
+                  </a:txBody>
+                  <a:tcPr/>
+                </a:tc>
+                <a:tc>
+                  <a:txBody>
+                    <a:bodyPr/>
+                    <a:lstStyle/>
+                    <a:p>
+                      <a:r>
+                        <a:rPr lang="en-US" dirty="0"/>
+                        <a:t>Sort Key (SK)</a:t>
+                      </a:r>
+                    </a:p>
+                  </a:txBody>
+                  <a:tcPr/>
+                </a:tc>
+                <a:extLst>
+                  <a:ext uri="{0D108BD9-81ED-4DB2-BD59-A6C34878D82A}">
+                    <a16:rowId xmlns:a16="http://schemas.microsoft.com/office/drawing/2014/main" val="1490163295"/>
+                  </a:ext>
+                </a:extLst>
+              </a:tr>
+              <a:tr h="610306">
+                <a:tc>
+                  <a:txBody>
+                    <a:bodyPr/>
+                    <a:lstStyle/>
+                    <a:p>
+                      <a:r>
+                        <a:rPr lang="en-US" dirty="0"/>
+                        <a:t>Region</a:t>
+                      </a:r>
+                    </a:p>
+                  </a:txBody>
+                  <a:tcPr/>
+                </a:tc>
+                <a:tc>
+                  <a:txBody>
+                    <a:bodyPr/>
+                    <a:lstStyle/>
+                    <a:p>
+                      <a:r>
+                        <a:rPr lang="en-US" dirty="0"/>
+                        <a:t>REG#&lt;reg-id&gt;</a:t>
+                      </a:r>
+                    </a:p>
+                  </a:txBody>
+                  <a:tcPr/>
+                </a:tc>
+                <a:tc>
+                  <a:txBody>
+                    <a:bodyPr/>
+                    <a:lstStyle/>
+                    <a:p>
+                      <a:endParaRPr lang="en-US" dirty="0"/>
+                    </a:p>
+                  </a:txBody>
+                  <a:tcPr/>
+                </a:tc>
+                <a:extLst>
+                  <a:ext uri="{0D108BD9-81ED-4DB2-BD59-A6C34878D82A}">
+                    <a16:rowId xmlns:a16="http://schemas.microsoft.com/office/drawing/2014/main" val="144224010"/>
+                  </a:ext>
+                </a:extLst>
+              </a:tr>
+              <a:tr h="610306">
+                <a:tc>
+                  <a:txBody>
+                    <a:bodyPr/>
+                    <a:lstStyle/>
+                    <a:p>
+                      <a:r>
+                        <a:rPr lang="en-US" dirty="0"/>
+                        <a:t>Scenario</a:t>
+                      </a:r>
+                    </a:p>
+                  </a:txBody>
+                  <a:tcPr/>
+                </a:tc>
+                <a:tc>
+                  <a:txBody>
+                    <a:bodyPr/>
+                    <a:lstStyle/>
+                    <a:p>
+                      <a:pPr marL="0" marR="0" lvl="0" indent="0" algn="l" defTabSz="914400" rtl="0" eaLnBrk="1" fontAlgn="auto" latinLnBrk="0" hangingPunct="1">
+                        <a:lnSpc>
+                          <a:spcPct val="100000"/>
+                        </a:lnSpc>
+                        <a:spcBef>
+                          <a:spcPts val="0"/>
+                        </a:spcBef>
+                        <a:spcAft>
+                          <a:spcPts val="0"/>
+                        </a:spcAft>
+                        <a:buClrTx/>
+                        <a:buSzTx/>
+                        <a:buFontTx/>
+                        <a:buNone/>
+                        <a:tabLst/>
+                        <a:defRPr/>
+                      </a:pPr>
+                      <a:r>
+                        <a:rPr lang="en-US" dirty="0"/>
+                        <a:t>REG#&lt;reg-id&gt;</a:t>
+                      </a:r>
+                    </a:p>
+                  </a:txBody>
+                  <a:tcPr/>
+                </a:tc>
+                <a:tc>
+                  <a:txBody>
+                    <a:bodyPr/>
+                    <a:lstStyle/>
+                    <a:p>
+                      <a:r>
+                        <a:rPr lang="en-US" dirty="0"/>
+                        <a:t>SCE#&lt;type&gt;#&lt;scen-id&gt;</a:t>
+                      </a:r>
+                    </a:p>
+                  </a:txBody>
+                  <a:tcPr/>
+                </a:tc>
+                <a:extLst>
+                  <a:ext uri="{0D108BD9-81ED-4DB2-BD59-A6C34878D82A}">
+                    <a16:rowId xmlns:a16="http://schemas.microsoft.com/office/drawing/2014/main" val="1592972635"/>
+                  </a:ext>
+                </a:extLst>
+              </a:tr>
+              <a:tr h="610306">
+                <a:tc>
+                  <a:txBody>
+                    <a:bodyPr/>
+                    <a:lstStyle/>
+                    <a:p>
+                      <a:r>
+                        <a:rPr lang="en-US" dirty="0"/>
+                        <a:t>Param</a:t>
+                      </a:r>
+                    </a:p>
+                  </a:txBody>
+                  <a:tcPr/>
+                </a:tc>
+                <a:tc>
+                  <a:txBody>
+                    <a:bodyPr/>
+                    <a:lstStyle/>
+                    <a:p>
+                      <a:pPr marL="0" marR="0" lvl="0" indent="0" algn="l" defTabSz="914400" rtl="0" eaLnBrk="1" fontAlgn="auto" latinLnBrk="0" hangingPunct="1">
+                        <a:lnSpc>
+                          <a:spcPct val="100000"/>
+                        </a:lnSpc>
+                        <a:spcBef>
+                          <a:spcPts val="0"/>
+                        </a:spcBef>
+                        <a:spcAft>
+                          <a:spcPts val="0"/>
+                        </a:spcAft>
+                        <a:buClrTx/>
+                        <a:buSzTx/>
+                        <a:buFontTx/>
+                        <a:buNone/>
+                        <a:tabLst/>
+                        <a:defRPr/>
+                      </a:pPr>
+                      <a:r>
+                        <a:rPr lang="en-US" dirty="0"/>
+                        <a:t>REG#&lt;reg-id&gt;</a:t>
+                      </a:r>
+                    </a:p>
+                  </a:txBody>
+                  <a:tcPr/>
+                </a:tc>
+                <a:tc>
+                  <a:txBody>
+                    <a:bodyPr/>
+                    <a:lstStyle/>
+                    <a:p>
+                      <a:r>
+                        <a:rPr lang="en-US" dirty="0"/>
+                        <a:t>PAR#</a:t>
+                      </a:r>
+                    </a:p>
+                  </a:txBody>
+                  <a:tcPr/>
+                </a:tc>
+                <a:extLst>
+                  <a:ext uri="{0D108BD9-81ED-4DB2-BD59-A6C34878D82A}">
+                    <a16:rowId xmlns:a16="http://schemas.microsoft.com/office/drawing/2014/main" val="3881365903"/>
+                  </a:ext>
+                </a:extLst>
+              </a:tr>
+              <a:tr h="610306">
+                <a:tc>
+                  <a:txBody>
+                    <a:bodyPr/>
+                    <a:lstStyle/>
+                    <a:p>
+                      <a:r>
+                        <a:rPr lang="en-US" dirty="0"/>
+                        <a:t>Class 1</a:t>
+                      </a:r>
+                    </a:p>
+                  </a:txBody>
+                  <a:tcPr/>
+                </a:tc>
+                <a:tc>
+                  <a:txBody>
+                    <a:bodyPr/>
+                    <a:lstStyle/>
+                    <a:p>
+                      <a:pPr marL="0" marR="0" lvl="0" indent="0" algn="l" defTabSz="914400" rtl="0" eaLnBrk="1" fontAlgn="auto" latinLnBrk="0" hangingPunct="1">
+                        <a:lnSpc>
+                          <a:spcPct val="100000"/>
+                        </a:lnSpc>
+                        <a:spcBef>
+                          <a:spcPts val="0"/>
+                        </a:spcBef>
+                        <a:spcAft>
+                          <a:spcPts val="0"/>
+                        </a:spcAft>
+                        <a:buClrTx/>
+                        <a:buSzTx/>
+                        <a:buFontTx/>
+                        <a:buNone/>
+                        <a:tabLst/>
+                        <a:defRPr/>
+                      </a:pPr>
+                      <a:r>
+                        <a:rPr lang="en-US" dirty="0"/>
+                        <a:t>REG#&lt;reg-id&gt;</a:t>
+                      </a:r>
+                    </a:p>
+                  </a:txBody>
+                  <a:tcPr/>
+                </a:tc>
+                <a:tc>
+                  <a:txBody>
+                    <a:bodyPr/>
+                    <a:lstStyle/>
+                    <a:p>
+                      <a:endParaRPr lang="en-US" dirty="0"/>
+                    </a:p>
+                  </a:txBody>
+                  <a:tcPr/>
+                </a:tc>
+                <a:extLst>
+                  <a:ext uri="{0D108BD9-81ED-4DB2-BD59-A6C34878D82A}">
+                    <a16:rowId xmlns:a16="http://schemas.microsoft.com/office/drawing/2014/main" val="588450801"/>
+                  </a:ext>
+                </a:extLst>
+              </a:tr>
+              <a:tr h="610306">
+                <a:tc>
+                  <a:txBody>
+                    <a:bodyPr/>
+                    <a:lstStyle/>
+                    <a:p>
+                      <a:r>
+                        <a:rPr lang="en-US" dirty="0"/>
+                        <a:t>Class 2</a:t>
+                      </a:r>
+                    </a:p>
+                  </a:txBody>
+                  <a:tcPr/>
+                </a:tc>
+                <a:tc>
+                  <a:txBody>
+                    <a:bodyPr/>
+                    <a:lstStyle/>
+                    <a:p>
+                      <a:pPr marL="0" marR="0" lvl="0" indent="0" algn="l" defTabSz="914400" rtl="0" eaLnBrk="1" fontAlgn="auto" latinLnBrk="0" hangingPunct="1">
+                        <a:lnSpc>
+                          <a:spcPct val="100000"/>
+                        </a:lnSpc>
+                        <a:spcBef>
+                          <a:spcPts val="0"/>
+                        </a:spcBef>
+                        <a:spcAft>
+                          <a:spcPts val="0"/>
+                        </a:spcAft>
+                        <a:buClrTx/>
+                        <a:buSzTx/>
+                        <a:buFontTx/>
+                        <a:buNone/>
+                        <a:tabLst/>
+                        <a:defRPr/>
+                      </a:pPr>
+                      <a:r>
+                        <a:rPr lang="en-US" dirty="0"/>
+                        <a:t>REG#&lt;reg-id&gt;</a:t>
+                      </a:r>
+                    </a:p>
+                  </a:txBody>
+                  <a:tcPr/>
+                </a:tc>
+                <a:tc>
+                  <a:txBody>
+                    <a:bodyPr/>
+                    <a:lstStyle/>
+                    <a:p>
+                      <a:endParaRPr lang="en-US" dirty="0"/>
+                    </a:p>
+                  </a:txBody>
+                  <a:tcPr/>
+                </a:tc>
+                <a:extLst>
+                  <a:ext uri="{0D108BD9-81ED-4DB2-BD59-A6C34878D82A}">
+                    <a16:rowId xmlns:a16="http://schemas.microsoft.com/office/drawing/2014/main" val="3359421690"/>
+                  </a:ext>
+                </a:extLst>
+              </a:tr>
+            </a:tbl>
+          </a:graphicData>
+        </a:graphic>
+      </p:graphicFrame>
+    </p:spTree>
+    <p:extLst>
+      <p:ext uri="{BB962C8B-B14F-4D97-AF65-F5344CB8AC3E}">
+        <p14:creationId xmlns:p14="http://schemas.microsoft.com/office/powerpoint/2010/main" val="2196138761"/>
+      </p:ext>
+    </p:extLst>
+  </p:cSld>
+  <p:clrMapOvr>
+    <a:masterClrMapping/>
+  </p:clrMapOvr>
+</p:sld>
+</file>
+
 <file path=ppt/slides/slide2.xml><?xml version="1.0" encoding="utf-8"?>
+<p:sld xmlns:a="http://schemas.openxmlformats.org/drawingml/2006/main" xmlns:r="http://schemas.openxmlformats.org/officeDocument/2006/relationships" xmlns:p="http://schemas.openxmlformats.org/presentationml/2006/main">
+  <p:cSld>
+    <p:spTree>
+      <p:nvGrpSpPr>
+        <p:cNvPr id="1" name=""/>
+        <p:cNvGrpSpPr/>
+        <p:nvPr/>
+      </p:nvGrpSpPr>
+      <p:grpSpPr>
+        <a:xfrm>
+          <a:off x="0" y="0"/>
+          <a:ext cx="0" cy="0"/>
+          <a:chOff x="0" y="0"/>
+          <a:chExt cx="0" cy="0"/>
+        </a:xfrm>
+      </p:grpSpPr>
+      <p:sp>
+        <p:nvSpPr>
+          <p:cNvPr id="2" name="Title 1">
+            <a:extLst>
+              <a:ext uri="{FF2B5EF4-FFF2-40B4-BE49-F238E27FC236}">
+                <a16:creationId xmlns:a16="http://schemas.microsoft.com/office/drawing/2014/main" id="{602EACD7-A778-DD12-B93F-B92F75FDDBB6}"/>
+              </a:ext>
+            </a:extLst>
+          </p:cNvPr>
+          <p:cNvSpPr>
+            <a:spLocks noGrp="1"/>
+          </p:cNvSpPr>
+          <p:nvPr>
+            <p:ph type="title"/>
+          </p:nvPr>
+        </p:nvSpPr>
+        <p:spPr>
+          <a:xfrm>
+            <a:off x="838200" y="2389519"/>
+            <a:ext cx="10515600" cy="1325563"/>
+          </a:xfrm>
+        </p:spPr>
+        <p:txBody>
+          <a:bodyPr/>
+          <a:lstStyle/>
+          <a:p>
+            <a:r>
+              <a:rPr lang="en-US" dirty="0"/>
+              <a:t>Dashboard Data Flows</a:t>
+            </a:r>
+          </a:p>
+        </p:txBody>
+      </p:sp>
+    </p:spTree>
+    <p:extLst>
+      <p:ext uri="{BB962C8B-B14F-4D97-AF65-F5344CB8AC3E}">
+        <p14:creationId xmlns:p14="http://schemas.microsoft.com/office/powerpoint/2010/main" val="1488637042"/>
+      </p:ext>
+    </p:extLst>
+  </p:cSld>
+  <p:clrMapOvr>
+    <a:masterClrMapping/>
+  </p:clrMapOvr>
+</p:sld>
+</file>
+
+<file path=ppt/slides/slide3.xml><?xml version="1.0" encoding="utf-8"?>
+<p:sld xmlns:a="http://schemas.openxmlformats.org/drawingml/2006/main" xmlns:r="http://schemas.openxmlformats.org/officeDocument/2006/relationships" xmlns:p="http://schemas.openxmlformats.org/presentationml/2006/main">
+  <p:cSld>
+    <p:spTree>
+      <p:nvGrpSpPr>
+        <p:cNvPr id="1" name=""/>
+        <p:cNvGrpSpPr/>
+        <p:nvPr/>
+      </p:nvGrpSpPr>
+      <p:grpSpPr>
+        <a:xfrm>
+          <a:off x="0" y="0"/>
+          <a:ext cx="0" cy="0"/>
+          <a:chOff x="0" y="0"/>
+          <a:chExt cx="0" cy="0"/>
+        </a:xfrm>
+      </p:grpSpPr>
+      <p:sp>
+        <p:nvSpPr>
+          <p:cNvPr id="2" name="Title 1">
+            <a:extLst>
+              <a:ext uri="{FF2B5EF4-FFF2-40B4-BE49-F238E27FC236}">
+                <a16:creationId xmlns:a16="http://schemas.microsoft.com/office/drawing/2014/main" id="{FDC43CBE-7F47-FC2F-7747-844EA82D4C1A}"/>
+              </a:ext>
+            </a:extLst>
+          </p:cNvPr>
+          <p:cNvSpPr>
+            <a:spLocks noGrp="1"/>
+          </p:cNvSpPr>
+          <p:nvPr>
+            <p:ph type="title"/>
+          </p:nvPr>
+        </p:nvSpPr>
+        <p:spPr/>
+        <p:txBody>
+          <a:bodyPr/>
+          <a:lstStyle/>
+          <a:p>
+            <a:endParaRPr lang="en-US"/>
+          </a:p>
+        </p:txBody>
+      </p:sp>
+      <p:sp>
+        <p:nvSpPr>
+          <p:cNvPr id="3" name="Content Placeholder 2">
+            <a:extLst>
+              <a:ext uri="{FF2B5EF4-FFF2-40B4-BE49-F238E27FC236}">
+                <a16:creationId xmlns:a16="http://schemas.microsoft.com/office/drawing/2014/main" id="{35B523F7-B947-6AD5-6344-4F02DD01EF93}"/>
+              </a:ext>
+            </a:extLst>
+          </p:cNvPr>
+          <p:cNvSpPr>
+            <a:spLocks noGrp="1"/>
+          </p:cNvSpPr>
+          <p:nvPr>
+            <p:ph idx="1"/>
+          </p:nvPr>
+        </p:nvSpPr>
+        <p:spPr/>
+        <p:txBody>
+          <a:bodyPr/>
+          <a:lstStyle/>
+          <a:p>
+            <a:endParaRPr lang="en-US"/>
+          </a:p>
+        </p:txBody>
+      </p:sp>
+    </p:spTree>
+    <p:extLst>
+      <p:ext uri="{BB962C8B-B14F-4D97-AF65-F5344CB8AC3E}">
+        <p14:creationId xmlns:p14="http://schemas.microsoft.com/office/powerpoint/2010/main" val="2683669947"/>
+      </p:ext>
+    </p:extLst>
+  </p:cSld>
+  <p:clrMapOvr>
+    <a:masterClrMapping/>
+  </p:clrMapOvr>
+</p:sld>
+</file>
+
+<file path=ppt/slides/slide4.xml><?xml version="1.0" encoding="utf-8"?>
 <p:sld xmlns:a="http://schemas.openxmlformats.org/drawingml/2006/main" xmlns:r="http://schemas.openxmlformats.org/officeDocument/2006/relationships" xmlns:p="http://schemas.openxmlformats.org/presentationml/2006/main">
   <p:cSld>
     <p:spTree>
@@ -9607,7 +11224,7 @@
 </p:sld>
 </file>
 
-<file path=ppt/slides/slide3.xml><?xml version="1.0" encoding="utf-8"?>
+<file path=ppt/slides/slide5.xml><?xml version="1.0" encoding="utf-8"?>
 <p:sld xmlns:a="http://schemas.openxmlformats.org/drawingml/2006/main" xmlns:r="http://schemas.openxmlformats.org/officeDocument/2006/relationships" xmlns:p="http://schemas.openxmlformats.org/presentationml/2006/main">
   <p:cSld>
     <p:spTree>
@@ -11668,7 +13285,7 @@
 </p:sld>
 </file>
 
-<file path=ppt/slides/slide4.xml><?xml version="1.0" encoding="utf-8"?>
+<file path=ppt/slides/slide6.xml><?xml version="1.0" encoding="utf-8"?>
 <p:sld xmlns:a="http://schemas.openxmlformats.org/drawingml/2006/main" xmlns:r="http://schemas.openxmlformats.org/officeDocument/2006/relationships" xmlns:p="http://schemas.openxmlformats.org/presentationml/2006/main">
   <p:cSld>
     <p:spTree>
@@ -15256,7 +16873,7 @@
 </p:sld>
 </file>
 
-<file path=ppt/slides/slide5.xml><?xml version="1.0" encoding="utf-8"?>
+<file path=ppt/slides/slide7.xml><?xml version="1.0" encoding="utf-8"?>
 <p:sld xmlns:a="http://schemas.openxmlformats.org/drawingml/2006/main" xmlns:r="http://schemas.openxmlformats.org/officeDocument/2006/relationships" xmlns:p="http://schemas.openxmlformats.org/presentationml/2006/main">
   <p:cSld>
     <p:spTree>
@@ -15297,7 +16914,7 @@
             <a:fld id="{FE7A4BB3-E848-5A44-82DF-322201952CD8}" type="slidenum">
               <a:rPr lang="en-US" smtClean="0"/>
               <a:pPr/>
-              <a:t>5</a:t>
+              <a:t>7</a:t>
             </a:fld>
             <a:endParaRPr lang="en-US" dirty="0"/>
           </a:p>
@@ -17216,7 +18833,7 @@
 </p:sld>
 </file>
 
-<file path=ppt/slides/slide6.xml><?xml version="1.0" encoding="utf-8"?>
+<file path=ppt/slides/slide8.xml><?xml version="1.0" encoding="utf-8"?>
 <p:sld xmlns:a="http://schemas.openxmlformats.org/drawingml/2006/main" xmlns:r="http://schemas.openxmlformats.org/officeDocument/2006/relationships" xmlns:p="http://schemas.openxmlformats.org/presentationml/2006/main">
   <p:cSld>
     <p:spTree>
@@ -17257,7 +18874,7 @@
             <a:fld id="{FE7A4BB3-E848-5A44-82DF-322201952CD8}" type="slidenum">
               <a:rPr lang="en-US" smtClean="0"/>
               <a:pPr/>
-              <a:t>6</a:t>
+              <a:t>8</a:t>
             </a:fld>
             <a:endParaRPr lang="en-US" dirty="0"/>
           </a:p>
@@ -20273,7 +21890,7 @@
 </p:sld>
 </file>
 
-<file path=ppt/slides/slide7.xml><?xml version="1.0" encoding="utf-8"?>
+<file path=ppt/slides/slide9.xml><?xml version="1.0" encoding="utf-8"?>
 <p:sld xmlns:a="http://schemas.openxmlformats.org/drawingml/2006/main" xmlns:r="http://schemas.openxmlformats.org/officeDocument/2006/relationships" xmlns:p="http://schemas.openxmlformats.org/presentationml/2006/main">
   <p:cSld>
     <p:spTree>
@@ -20461,1478 +22078,6 @@
     <p:extLst>
       <p:ext uri="{BB962C8B-B14F-4D97-AF65-F5344CB8AC3E}">
         <p14:creationId xmlns:p14="http://schemas.microsoft.com/office/powerpoint/2010/main" val="2671242595"/>
-      </p:ext>
-    </p:extLst>
-  </p:cSld>
-  <p:clrMapOvr>
-    <a:masterClrMapping/>
-  </p:clrMapOvr>
-</p:sld>
-</file>
-
-<file path=ppt/slides/slide8.xml><?xml version="1.0" encoding="utf-8"?>
-<p:sld xmlns:a="http://schemas.openxmlformats.org/drawingml/2006/main" xmlns:r="http://schemas.openxmlformats.org/officeDocument/2006/relationships" xmlns:p="http://schemas.openxmlformats.org/presentationml/2006/main">
-  <p:cSld>
-    <p:spTree>
-      <p:nvGrpSpPr>
-        <p:cNvPr id="1" name=""/>
-        <p:cNvGrpSpPr/>
-        <p:nvPr/>
-      </p:nvGrpSpPr>
-      <p:grpSpPr>
-        <a:xfrm>
-          <a:off x="0" y="0"/>
-          <a:ext cx="0" cy="0"/>
-          <a:chOff x="0" y="0"/>
-          <a:chExt cx="0" cy="0"/>
-        </a:xfrm>
-      </p:grpSpPr>
-      <p:sp>
-        <p:nvSpPr>
-          <p:cNvPr id="2" name="Title 1">
-            <a:extLst>
-              <a:ext uri="{FF2B5EF4-FFF2-40B4-BE49-F238E27FC236}">
-                <a16:creationId xmlns:a16="http://schemas.microsoft.com/office/drawing/2014/main" id="{F591C7DA-F06F-3612-2787-A8CBAA9DD492}"/>
-              </a:ext>
-            </a:extLst>
-          </p:cNvPr>
-          <p:cNvSpPr>
-            <a:spLocks noGrp="1"/>
-          </p:cNvSpPr>
-          <p:nvPr>
-            <p:ph type="title"/>
-          </p:nvPr>
-        </p:nvSpPr>
-        <p:spPr/>
-        <p:txBody>
-          <a:bodyPr/>
-          <a:lstStyle/>
-          <a:p>
-            <a:r>
-              <a:rPr lang="en-US" dirty="0"/>
-              <a:t>1. Entity Diagram, 2. Relationships, 3. Identify Access Patterns</a:t>
-            </a:r>
-          </a:p>
-        </p:txBody>
-      </p:sp>
-      <p:sp>
-        <p:nvSpPr>
-          <p:cNvPr id="4" name="Rectangle: Rounded Corners 3">
-            <a:extLst>
-              <a:ext uri="{FF2B5EF4-FFF2-40B4-BE49-F238E27FC236}">
-                <a16:creationId xmlns:a16="http://schemas.microsoft.com/office/drawing/2014/main" id="{D020F353-FD85-9C9D-C783-0D3DCB9D5334}"/>
-              </a:ext>
-            </a:extLst>
-          </p:cNvPr>
-          <p:cNvSpPr/>
-          <p:nvPr/>
-        </p:nvSpPr>
-        <p:spPr>
-          <a:xfrm>
-            <a:off x="297407" y="2435739"/>
-            <a:ext cx="2386083" cy="1325563"/>
-          </a:xfrm>
-          <a:prstGeom prst="roundRect">
-            <a:avLst/>
-          </a:prstGeom>
-        </p:spPr>
-        <p:style>
-          <a:lnRef idx="2">
-            <a:schemeClr val="accent1">
-              <a:shade val="50000"/>
-            </a:schemeClr>
-          </a:lnRef>
-          <a:fillRef idx="1">
-            <a:schemeClr val="accent1"/>
-          </a:fillRef>
-          <a:effectRef idx="0">
-            <a:schemeClr val="accent1"/>
-          </a:effectRef>
-          <a:fontRef idx="minor">
-            <a:schemeClr val="lt1"/>
-          </a:fontRef>
-        </p:style>
-        <p:txBody>
-          <a:bodyPr rtlCol="0" anchor="ctr"/>
-          <a:lstStyle/>
-          <a:p>
-            <a:pPr algn="ctr"/>
-            <a:r>
-              <a:rPr lang="en-US" dirty="0"/>
-              <a:t>Region</a:t>
-            </a:r>
-          </a:p>
-          <a:p>
-            <a:pPr marL="285750" indent="-285750" algn="ctr">
-              <a:buFontTx/>
-              <a:buChar char="-"/>
-            </a:pPr>
-            <a:r>
-              <a:rPr lang="en-US" dirty="0" err="1"/>
-              <a:t>reg_id</a:t>
-            </a:r>
-            <a:endParaRPr lang="en-US" dirty="0"/>
-          </a:p>
-          <a:p>
-            <a:pPr marL="285750" indent="-285750" algn="ctr">
-              <a:buFontTx/>
-              <a:buChar char="-"/>
-            </a:pPr>
-            <a:r>
-              <a:rPr lang="en-US" dirty="0"/>
-              <a:t>name</a:t>
-            </a:r>
-          </a:p>
-          <a:p>
-            <a:pPr marL="285750" indent="-285750" algn="ctr">
-              <a:buFontTx/>
-              <a:buChar char="-"/>
-            </a:pPr>
-            <a:r>
-              <a:rPr lang="en-US" dirty="0"/>
-              <a:t>type</a:t>
-            </a:r>
-          </a:p>
-        </p:txBody>
-      </p:sp>
-      <p:sp>
-        <p:nvSpPr>
-          <p:cNvPr id="5" name="Rectangle: Rounded Corners 4">
-            <a:extLst>
-              <a:ext uri="{FF2B5EF4-FFF2-40B4-BE49-F238E27FC236}">
-                <a16:creationId xmlns:a16="http://schemas.microsoft.com/office/drawing/2014/main" id="{E0A18936-4DD6-7F5F-941B-3BF2C44C06AA}"/>
-              </a:ext>
-            </a:extLst>
-          </p:cNvPr>
-          <p:cNvSpPr/>
-          <p:nvPr/>
-        </p:nvSpPr>
-        <p:spPr>
-          <a:xfrm>
-            <a:off x="3085527" y="1775012"/>
-            <a:ext cx="2386083" cy="2571113"/>
-          </a:xfrm>
-          <a:prstGeom prst="roundRect">
-            <a:avLst/>
-          </a:prstGeom>
-        </p:spPr>
-        <p:style>
-          <a:lnRef idx="2">
-            <a:schemeClr val="accent1">
-              <a:shade val="50000"/>
-            </a:schemeClr>
-          </a:lnRef>
-          <a:fillRef idx="1">
-            <a:schemeClr val="accent1"/>
-          </a:fillRef>
-          <a:effectRef idx="0">
-            <a:schemeClr val="accent1"/>
-          </a:effectRef>
-          <a:fontRef idx="minor">
-            <a:schemeClr val="lt1"/>
-          </a:fontRef>
-        </p:style>
-        <p:txBody>
-          <a:bodyPr rtlCol="0" anchor="ctr"/>
-          <a:lstStyle/>
-          <a:p>
-            <a:pPr algn="ctr"/>
-            <a:r>
-              <a:rPr lang="en-US" dirty="0"/>
-              <a:t>Scenario</a:t>
-            </a:r>
-          </a:p>
-          <a:p>
-            <a:pPr marL="285750" indent="-285750" algn="ctr">
-              <a:buFontTx/>
-              <a:buChar char="-"/>
-            </a:pPr>
-            <a:r>
-              <a:rPr lang="en-US" dirty="0" err="1"/>
-              <a:t>scen_id</a:t>
-            </a:r>
-            <a:endParaRPr lang="en-US" dirty="0"/>
-          </a:p>
-          <a:p>
-            <a:pPr marL="285750" indent="-285750" algn="ctr">
-              <a:buFontTx/>
-              <a:buChar char="-"/>
-            </a:pPr>
-            <a:r>
-              <a:rPr lang="en-US" dirty="0"/>
-              <a:t>name</a:t>
-            </a:r>
-          </a:p>
-          <a:p>
-            <a:pPr marL="285750" indent="-285750" algn="ctr">
-              <a:buFontTx/>
-              <a:buChar char="-"/>
-            </a:pPr>
-            <a:r>
-              <a:rPr lang="en-US" dirty="0"/>
-              <a:t>type</a:t>
-            </a:r>
-          </a:p>
-          <a:p>
-            <a:pPr marL="285750" indent="-285750" algn="ctr">
-              <a:buFontTx/>
-              <a:buChar char="-"/>
-            </a:pPr>
-            <a:r>
-              <a:rPr lang="en-US" dirty="0" err="1"/>
-              <a:t>scen_ref</a:t>
-            </a:r>
-            <a:endParaRPr lang="en-US" dirty="0"/>
-          </a:p>
-          <a:p>
-            <a:pPr marL="285750" indent="-285750" algn="ctr">
-              <a:buFontTx/>
-              <a:buChar char="-"/>
-            </a:pPr>
-            <a:r>
-              <a:rPr lang="en-US" dirty="0" err="1"/>
-              <a:t>scen_diff</a:t>
-            </a:r>
-            <a:endParaRPr lang="en-US" dirty="0"/>
-          </a:p>
-          <a:p>
-            <a:pPr marL="285750" indent="-285750" algn="ctr">
-              <a:buFontTx/>
-              <a:buChar char="-"/>
-            </a:pPr>
-            <a:r>
-              <a:rPr lang="en-US" dirty="0"/>
-              <a:t>year</a:t>
-            </a:r>
-          </a:p>
-        </p:txBody>
-      </p:sp>
-      <p:sp>
-        <p:nvSpPr>
-          <p:cNvPr id="7" name="Rectangle: Rounded Corners 6">
-            <a:extLst>
-              <a:ext uri="{FF2B5EF4-FFF2-40B4-BE49-F238E27FC236}">
-                <a16:creationId xmlns:a16="http://schemas.microsoft.com/office/drawing/2014/main" id="{E21567AC-4944-BB0B-F88E-F49D2873C887}"/>
-              </a:ext>
-            </a:extLst>
-          </p:cNvPr>
-          <p:cNvSpPr/>
-          <p:nvPr/>
-        </p:nvSpPr>
-        <p:spPr>
-          <a:xfrm>
-            <a:off x="7793183" y="2435738"/>
-            <a:ext cx="1810651" cy="1325563"/>
-          </a:xfrm>
-          <a:prstGeom prst="roundRect">
-            <a:avLst/>
-          </a:prstGeom>
-        </p:spPr>
-        <p:style>
-          <a:lnRef idx="2">
-            <a:schemeClr val="accent1">
-              <a:shade val="50000"/>
-            </a:schemeClr>
-          </a:lnRef>
-          <a:fillRef idx="1">
-            <a:schemeClr val="accent1"/>
-          </a:fillRef>
-          <a:effectRef idx="0">
-            <a:schemeClr val="accent1"/>
-          </a:effectRef>
-          <a:fontRef idx="minor">
-            <a:schemeClr val="lt1"/>
-          </a:fontRef>
-        </p:style>
-        <p:txBody>
-          <a:bodyPr rtlCol="0" anchor="ctr"/>
-          <a:lstStyle/>
-          <a:p>
-            <a:pPr algn="ctr"/>
-            <a:r>
-              <a:rPr lang="en-US" dirty="0"/>
-              <a:t>Class1</a:t>
-            </a:r>
-          </a:p>
-          <a:p>
-            <a:pPr algn="ctr"/>
-            <a:r>
-              <a:rPr lang="en-US" dirty="0"/>
-              <a:t>- class1_id</a:t>
-            </a:r>
-          </a:p>
-          <a:p>
-            <a:pPr marL="285750" indent="-285750" algn="ctr">
-              <a:buFontTx/>
-              <a:buChar char="-"/>
-            </a:pPr>
-            <a:r>
-              <a:rPr lang="en-US" dirty="0"/>
-              <a:t>Name</a:t>
-            </a:r>
-          </a:p>
-          <a:p>
-            <a:pPr marL="285750" indent="-285750" algn="ctr">
-              <a:buFontTx/>
-              <a:buChar char="-"/>
-            </a:pPr>
-            <a:r>
-              <a:rPr lang="en-US" dirty="0"/>
-              <a:t>value</a:t>
-            </a:r>
-          </a:p>
-        </p:txBody>
-      </p:sp>
-      <p:sp>
-        <p:nvSpPr>
-          <p:cNvPr id="8" name="Rectangle: Rounded Corners 7">
-            <a:extLst>
-              <a:ext uri="{FF2B5EF4-FFF2-40B4-BE49-F238E27FC236}">
-                <a16:creationId xmlns:a16="http://schemas.microsoft.com/office/drawing/2014/main" id="{DDA4B277-1F3D-1CD1-87F9-D9D7AC58EF3F}"/>
-              </a:ext>
-            </a:extLst>
-          </p:cNvPr>
-          <p:cNvSpPr/>
-          <p:nvPr/>
-        </p:nvSpPr>
-        <p:spPr>
-          <a:xfrm>
-            <a:off x="10241159" y="2439490"/>
-            <a:ext cx="1810651" cy="1325563"/>
-          </a:xfrm>
-          <a:prstGeom prst="roundRect">
-            <a:avLst/>
-          </a:prstGeom>
-        </p:spPr>
-        <p:style>
-          <a:lnRef idx="2">
-            <a:schemeClr val="accent1">
-              <a:shade val="50000"/>
-            </a:schemeClr>
-          </a:lnRef>
-          <a:fillRef idx="1">
-            <a:schemeClr val="accent1"/>
-          </a:fillRef>
-          <a:effectRef idx="0">
-            <a:schemeClr val="accent1"/>
-          </a:effectRef>
-          <a:fontRef idx="minor">
-            <a:schemeClr val="lt1"/>
-          </a:fontRef>
-        </p:style>
-        <p:txBody>
-          <a:bodyPr rtlCol="0" anchor="ctr"/>
-          <a:lstStyle/>
-          <a:p>
-            <a:pPr algn="ctr"/>
-            <a:r>
-              <a:rPr lang="en-US" dirty="0"/>
-              <a:t>Class2</a:t>
-            </a:r>
-          </a:p>
-          <a:p>
-            <a:pPr algn="ctr"/>
-            <a:r>
-              <a:rPr lang="en-US" dirty="0"/>
-              <a:t>- class2_id </a:t>
-            </a:r>
-          </a:p>
-          <a:p>
-            <a:pPr marL="285750" indent="-285750" algn="ctr">
-              <a:buFontTx/>
-              <a:buChar char="-"/>
-            </a:pPr>
-            <a:r>
-              <a:rPr lang="en-US" dirty="0"/>
-              <a:t>Name</a:t>
-            </a:r>
-          </a:p>
-          <a:p>
-            <a:pPr marL="285750" indent="-285750" algn="ctr">
-              <a:buFontTx/>
-              <a:buChar char="-"/>
-            </a:pPr>
-            <a:r>
-              <a:rPr lang="en-US" dirty="0"/>
-              <a:t>value</a:t>
-            </a:r>
-          </a:p>
-        </p:txBody>
-      </p:sp>
-      <p:cxnSp>
-        <p:nvCxnSpPr>
-          <p:cNvPr id="10" name="Straight Connector 9">
-            <a:extLst>
-              <a:ext uri="{FF2B5EF4-FFF2-40B4-BE49-F238E27FC236}">
-                <a16:creationId xmlns:a16="http://schemas.microsoft.com/office/drawing/2014/main" id="{1F208BF0-F55D-C89F-7F8F-50998EB1F1A7}"/>
-              </a:ext>
-            </a:extLst>
-          </p:cNvPr>
-          <p:cNvCxnSpPr>
-            <a:cxnSpLocks/>
-            <a:stCxn id="4" idx="3"/>
-            <a:endCxn id="5" idx="1"/>
-          </p:cNvCxnSpPr>
-          <p:nvPr/>
-        </p:nvCxnSpPr>
-        <p:spPr>
-          <a:xfrm flipV="1">
-            <a:off x="2683490" y="3060569"/>
-            <a:ext cx="402037" cy="37952"/>
-          </a:xfrm>
-          <a:prstGeom prst="line">
-            <a:avLst/>
-          </a:prstGeom>
-          <a:ln w="12700"/>
-        </p:spPr>
-        <p:style>
-          <a:lnRef idx="1">
-            <a:schemeClr val="accent1"/>
-          </a:lnRef>
-          <a:fillRef idx="0">
-            <a:schemeClr val="accent1"/>
-          </a:fillRef>
-          <a:effectRef idx="0">
-            <a:schemeClr val="accent1"/>
-          </a:effectRef>
-          <a:fontRef idx="minor">
-            <a:schemeClr val="tx1"/>
-          </a:fontRef>
-        </p:style>
-      </p:cxnSp>
-      <p:cxnSp>
-        <p:nvCxnSpPr>
-          <p:cNvPr id="11" name="Straight Connector 10">
-            <a:extLst>
-              <a:ext uri="{FF2B5EF4-FFF2-40B4-BE49-F238E27FC236}">
-                <a16:creationId xmlns:a16="http://schemas.microsoft.com/office/drawing/2014/main" id="{4D1F0218-6995-45A1-AF6A-429F3757BB0F}"/>
-              </a:ext>
-            </a:extLst>
-          </p:cNvPr>
-          <p:cNvCxnSpPr>
-            <a:cxnSpLocks/>
-            <a:stCxn id="4" idx="3"/>
-            <a:endCxn id="5" idx="2"/>
-          </p:cNvCxnSpPr>
-          <p:nvPr/>
-        </p:nvCxnSpPr>
-        <p:spPr>
-          <a:xfrm>
-            <a:off x="2683490" y="3098521"/>
-            <a:ext cx="1595079" cy="1247604"/>
-          </a:xfrm>
-          <a:prstGeom prst="line">
-            <a:avLst/>
-          </a:prstGeom>
-          <a:ln w="12700"/>
-        </p:spPr>
-        <p:style>
-          <a:lnRef idx="1">
-            <a:schemeClr val="accent1"/>
-          </a:lnRef>
-          <a:fillRef idx="0">
-            <a:schemeClr val="accent1"/>
-          </a:fillRef>
-          <a:effectRef idx="0">
-            <a:schemeClr val="accent1"/>
-          </a:effectRef>
-          <a:fontRef idx="minor">
-            <a:schemeClr val="tx1"/>
-          </a:fontRef>
-        </p:style>
-      </p:cxnSp>
-      <p:cxnSp>
-        <p:nvCxnSpPr>
-          <p:cNvPr id="14" name="Straight Connector 13">
-            <a:extLst>
-              <a:ext uri="{FF2B5EF4-FFF2-40B4-BE49-F238E27FC236}">
-                <a16:creationId xmlns:a16="http://schemas.microsoft.com/office/drawing/2014/main" id="{9CBF70A8-2867-3E8F-3A8C-E6791732DFE7}"/>
-              </a:ext>
-            </a:extLst>
-          </p:cNvPr>
-          <p:cNvCxnSpPr>
-            <a:cxnSpLocks/>
-            <a:stCxn id="4" idx="3"/>
-            <a:endCxn id="5" idx="0"/>
-          </p:cNvCxnSpPr>
-          <p:nvPr/>
-        </p:nvCxnSpPr>
-        <p:spPr>
-          <a:xfrm flipV="1">
-            <a:off x="2683490" y="1775012"/>
-            <a:ext cx="1595079" cy="1323509"/>
-          </a:xfrm>
-          <a:prstGeom prst="line">
-            <a:avLst/>
-          </a:prstGeom>
-          <a:ln w="12700"/>
-        </p:spPr>
-        <p:style>
-          <a:lnRef idx="1">
-            <a:schemeClr val="accent1"/>
-          </a:lnRef>
-          <a:fillRef idx="0">
-            <a:schemeClr val="accent1"/>
-          </a:fillRef>
-          <a:effectRef idx="0">
-            <a:schemeClr val="accent1"/>
-          </a:effectRef>
-          <a:fontRef idx="minor">
-            <a:schemeClr val="tx1"/>
-          </a:fontRef>
-        </p:style>
-      </p:cxnSp>
-      <p:cxnSp>
-        <p:nvCxnSpPr>
-          <p:cNvPr id="40" name="Straight Connector 39">
-            <a:extLst>
-              <a:ext uri="{FF2B5EF4-FFF2-40B4-BE49-F238E27FC236}">
-                <a16:creationId xmlns:a16="http://schemas.microsoft.com/office/drawing/2014/main" id="{FE1F722A-A2D8-9718-34AB-665795EAFAB2}"/>
-              </a:ext>
-            </a:extLst>
-          </p:cNvPr>
-          <p:cNvCxnSpPr>
-            <a:cxnSpLocks/>
-            <a:stCxn id="5" idx="3"/>
-            <a:endCxn id="7" idx="1"/>
-          </p:cNvCxnSpPr>
-          <p:nvPr/>
-        </p:nvCxnSpPr>
-        <p:spPr>
-          <a:xfrm>
-            <a:off x="5471610" y="3060569"/>
-            <a:ext cx="2321573" cy="37951"/>
-          </a:xfrm>
-          <a:prstGeom prst="line">
-            <a:avLst/>
-          </a:prstGeom>
-          <a:ln w="12700"/>
-        </p:spPr>
-        <p:style>
-          <a:lnRef idx="1">
-            <a:schemeClr val="accent1"/>
-          </a:lnRef>
-          <a:fillRef idx="0">
-            <a:schemeClr val="accent1"/>
-          </a:fillRef>
-          <a:effectRef idx="0">
-            <a:schemeClr val="accent1"/>
-          </a:effectRef>
-          <a:fontRef idx="minor">
-            <a:schemeClr val="tx1"/>
-          </a:fontRef>
-        </p:style>
-      </p:cxnSp>
-      <p:cxnSp>
-        <p:nvCxnSpPr>
-          <p:cNvPr id="41" name="Straight Connector 40">
-            <a:extLst>
-              <a:ext uri="{FF2B5EF4-FFF2-40B4-BE49-F238E27FC236}">
-                <a16:creationId xmlns:a16="http://schemas.microsoft.com/office/drawing/2014/main" id="{485277DF-3C8C-A532-E6D5-CFEA9A48A6D1}"/>
-              </a:ext>
-            </a:extLst>
-          </p:cNvPr>
-          <p:cNvCxnSpPr>
-            <a:cxnSpLocks/>
-            <a:stCxn id="5" idx="3"/>
-            <a:endCxn id="7" idx="2"/>
-          </p:cNvCxnSpPr>
-          <p:nvPr/>
-        </p:nvCxnSpPr>
-        <p:spPr>
-          <a:xfrm>
-            <a:off x="5471610" y="3060569"/>
-            <a:ext cx="3226899" cy="700732"/>
-          </a:xfrm>
-          <a:prstGeom prst="line">
-            <a:avLst/>
-          </a:prstGeom>
-          <a:ln w="12700"/>
-        </p:spPr>
-        <p:style>
-          <a:lnRef idx="1">
-            <a:schemeClr val="accent1"/>
-          </a:lnRef>
-          <a:fillRef idx="0">
-            <a:schemeClr val="accent1"/>
-          </a:fillRef>
-          <a:effectRef idx="0">
-            <a:schemeClr val="accent1"/>
-          </a:effectRef>
-          <a:fontRef idx="minor">
-            <a:schemeClr val="tx1"/>
-          </a:fontRef>
-        </p:style>
-      </p:cxnSp>
-      <p:cxnSp>
-        <p:nvCxnSpPr>
-          <p:cNvPr id="42" name="Straight Connector 41">
-            <a:extLst>
-              <a:ext uri="{FF2B5EF4-FFF2-40B4-BE49-F238E27FC236}">
-                <a16:creationId xmlns:a16="http://schemas.microsoft.com/office/drawing/2014/main" id="{F75FE0CB-BE1E-7146-AC17-2ABB4282EB1E}"/>
-              </a:ext>
-            </a:extLst>
-          </p:cNvPr>
-          <p:cNvCxnSpPr>
-            <a:cxnSpLocks/>
-            <a:stCxn id="5" idx="3"/>
-            <a:endCxn id="7" idx="0"/>
-          </p:cNvCxnSpPr>
-          <p:nvPr/>
-        </p:nvCxnSpPr>
-        <p:spPr>
-          <a:xfrm flipV="1">
-            <a:off x="5471610" y="2435738"/>
-            <a:ext cx="3226899" cy="624831"/>
-          </a:xfrm>
-          <a:prstGeom prst="line">
-            <a:avLst/>
-          </a:prstGeom>
-          <a:ln w="12700"/>
-        </p:spPr>
-        <p:style>
-          <a:lnRef idx="1">
-            <a:schemeClr val="accent1"/>
-          </a:lnRef>
-          <a:fillRef idx="0">
-            <a:schemeClr val="accent1"/>
-          </a:fillRef>
-          <a:effectRef idx="0">
-            <a:schemeClr val="accent1"/>
-          </a:effectRef>
-          <a:fontRef idx="minor">
-            <a:schemeClr val="tx1"/>
-          </a:fontRef>
-        </p:style>
-      </p:cxnSp>
-      <p:cxnSp>
-        <p:nvCxnSpPr>
-          <p:cNvPr id="55" name="Straight Connector 54">
-            <a:extLst>
-              <a:ext uri="{FF2B5EF4-FFF2-40B4-BE49-F238E27FC236}">
-                <a16:creationId xmlns:a16="http://schemas.microsoft.com/office/drawing/2014/main" id="{B3B79EAB-4220-2207-138A-39B92D2B8779}"/>
-              </a:ext>
-            </a:extLst>
-          </p:cNvPr>
-          <p:cNvCxnSpPr>
-            <a:cxnSpLocks/>
-            <a:stCxn id="7" idx="3"/>
-            <a:endCxn id="8" idx="0"/>
-          </p:cNvCxnSpPr>
-          <p:nvPr/>
-        </p:nvCxnSpPr>
-        <p:spPr>
-          <a:xfrm flipV="1">
-            <a:off x="9603834" y="2439490"/>
-            <a:ext cx="1542651" cy="659030"/>
-          </a:xfrm>
-          <a:prstGeom prst="line">
-            <a:avLst/>
-          </a:prstGeom>
-          <a:ln w="12700"/>
-        </p:spPr>
-        <p:style>
-          <a:lnRef idx="1">
-            <a:schemeClr val="accent1"/>
-          </a:lnRef>
-          <a:fillRef idx="0">
-            <a:schemeClr val="accent1"/>
-          </a:fillRef>
-          <a:effectRef idx="0">
-            <a:schemeClr val="accent1"/>
-          </a:effectRef>
-          <a:fontRef idx="minor">
-            <a:schemeClr val="tx1"/>
-          </a:fontRef>
-        </p:style>
-      </p:cxnSp>
-      <p:cxnSp>
-        <p:nvCxnSpPr>
-          <p:cNvPr id="56" name="Straight Connector 55">
-            <a:extLst>
-              <a:ext uri="{FF2B5EF4-FFF2-40B4-BE49-F238E27FC236}">
-                <a16:creationId xmlns:a16="http://schemas.microsoft.com/office/drawing/2014/main" id="{54F62048-F68E-54E7-481A-A3885A3D0CFF}"/>
-              </a:ext>
-            </a:extLst>
-          </p:cNvPr>
-          <p:cNvCxnSpPr>
-            <a:cxnSpLocks/>
-            <a:stCxn id="7" idx="3"/>
-            <a:endCxn id="8" idx="1"/>
-          </p:cNvCxnSpPr>
-          <p:nvPr/>
-        </p:nvCxnSpPr>
-        <p:spPr>
-          <a:xfrm>
-            <a:off x="9603834" y="3098520"/>
-            <a:ext cx="637325" cy="3752"/>
-          </a:xfrm>
-          <a:prstGeom prst="line">
-            <a:avLst/>
-          </a:prstGeom>
-          <a:ln w="12700"/>
-        </p:spPr>
-        <p:style>
-          <a:lnRef idx="1">
-            <a:schemeClr val="accent1"/>
-          </a:lnRef>
-          <a:fillRef idx="0">
-            <a:schemeClr val="accent1"/>
-          </a:fillRef>
-          <a:effectRef idx="0">
-            <a:schemeClr val="accent1"/>
-          </a:effectRef>
-          <a:fontRef idx="minor">
-            <a:schemeClr val="tx1"/>
-          </a:fontRef>
-        </p:style>
-      </p:cxnSp>
-      <p:cxnSp>
-        <p:nvCxnSpPr>
-          <p:cNvPr id="57" name="Straight Connector 56">
-            <a:extLst>
-              <a:ext uri="{FF2B5EF4-FFF2-40B4-BE49-F238E27FC236}">
-                <a16:creationId xmlns:a16="http://schemas.microsoft.com/office/drawing/2014/main" id="{6A54BF1D-9BBE-70D0-F7E6-F08A75116FB9}"/>
-              </a:ext>
-            </a:extLst>
-          </p:cNvPr>
-          <p:cNvCxnSpPr>
-            <a:cxnSpLocks/>
-            <a:stCxn id="7" idx="3"/>
-            <a:endCxn id="8" idx="2"/>
-          </p:cNvCxnSpPr>
-          <p:nvPr/>
-        </p:nvCxnSpPr>
-        <p:spPr>
-          <a:xfrm>
-            <a:off x="9603834" y="3098520"/>
-            <a:ext cx="1542651" cy="666533"/>
-          </a:xfrm>
-          <a:prstGeom prst="line">
-            <a:avLst/>
-          </a:prstGeom>
-          <a:ln w="12700"/>
-        </p:spPr>
-        <p:style>
-          <a:lnRef idx="1">
-            <a:schemeClr val="accent1"/>
-          </a:lnRef>
-          <a:fillRef idx="0">
-            <a:schemeClr val="accent1"/>
-          </a:fillRef>
-          <a:effectRef idx="0">
-            <a:schemeClr val="accent1"/>
-          </a:effectRef>
-          <a:fontRef idx="minor">
-            <a:schemeClr val="tx1"/>
-          </a:fontRef>
-        </p:style>
-      </p:cxnSp>
-      <p:sp>
-        <p:nvSpPr>
-          <p:cNvPr id="17" name="Rectangle: Rounded Corners 16">
-            <a:extLst>
-              <a:ext uri="{FF2B5EF4-FFF2-40B4-BE49-F238E27FC236}">
-                <a16:creationId xmlns:a16="http://schemas.microsoft.com/office/drawing/2014/main" id="{3CC6EFB5-86E0-78BC-C8A5-6D5F219AEBA1}"/>
-              </a:ext>
-            </a:extLst>
-          </p:cNvPr>
-          <p:cNvSpPr/>
-          <p:nvPr/>
-        </p:nvSpPr>
-        <p:spPr>
-          <a:xfrm>
-            <a:off x="222524" y="4581382"/>
-            <a:ext cx="2535848" cy="1631033"/>
-          </a:xfrm>
-          <a:prstGeom prst="roundRect">
-            <a:avLst/>
-          </a:prstGeom>
-        </p:spPr>
-        <p:style>
-          <a:lnRef idx="2">
-            <a:schemeClr val="accent3"/>
-          </a:lnRef>
-          <a:fillRef idx="1">
-            <a:schemeClr val="lt1"/>
-          </a:fillRef>
-          <a:effectRef idx="0">
-            <a:schemeClr val="accent3"/>
-          </a:effectRef>
-          <a:fontRef idx="minor">
-            <a:schemeClr val="dk1"/>
-          </a:fontRef>
-        </p:style>
-        <p:txBody>
-          <a:bodyPr rtlCol="0" anchor="ctr"/>
-          <a:lstStyle/>
-          <a:p>
-            <a:pPr marL="285750" indent="-285750">
-              <a:buFont typeface="Arial" panose="020B0604020202020204" pitchFamily="34" charset="0"/>
-              <a:buChar char="•"/>
-            </a:pPr>
-            <a:r>
-              <a:rPr lang="en-US" sz="1600" dirty="0"/>
-              <a:t>Find a region by name</a:t>
-            </a:r>
-          </a:p>
-          <a:p>
-            <a:pPr marL="285750" indent="-285750">
-              <a:buFont typeface="Arial" panose="020B0604020202020204" pitchFamily="34" charset="0"/>
-              <a:buChar char="•"/>
-            </a:pPr>
-            <a:r>
-              <a:rPr lang="en-US" sz="1600" dirty="0"/>
-              <a:t>Find a region by type</a:t>
-            </a:r>
-          </a:p>
-          <a:p>
-            <a:pPr marL="285750" indent="-285750">
-              <a:buFont typeface="Arial" panose="020B0604020202020204" pitchFamily="34" charset="0"/>
-              <a:buChar char="•"/>
-            </a:pPr>
-            <a:r>
-              <a:rPr lang="en-US" sz="1600" dirty="0"/>
-              <a:t>Find all scenarios</a:t>
-            </a:r>
-          </a:p>
-          <a:p>
-            <a:pPr marL="285750" indent="-285750">
-              <a:buFont typeface="Arial" panose="020B0604020202020204" pitchFamily="34" charset="0"/>
-              <a:buChar char="•"/>
-            </a:pPr>
-            <a:r>
-              <a:rPr lang="en-US" sz="1600" dirty="0"/>
-              <a:t>Find all class 1</a:t>
-            </a:r>
-          </a:p>
-          <a:p>
-            <a:pPr marL="285750" indent="-285750">
-              <a:buFont typeface="Arial" panose="020B0604020202020204" pitchFamily="34" charset="0"/>
-              <a:buChar char="•"/>
-            </a:pPr>
-            <a:r>
-              <a:rPr lang="en-US" sz="1600" dirty="0"/>
-              <a:t>Find all class 2</a:t>
-            </a:r>
-          </a:p>
-        </p:txBody>
-      </p:sp>
-      <p:sp>
-        <p:nvSpPr>
-          <p:cNvPr id="18" name="Rectangle: Rounded Corners 17">
-            <a:extLst>
-              <a:ext uri="{FF2B5EF4-FFF2-40B4-BE49-F238E27FC236}">
-                <a16:creationId xmlns:a16="http://schemas.microsoft.com/office/drawing/2014/main" id="{AFDF7C67-DF7A-7335-2873-6F4F55C7B3DD}"/>
-              </a:ext>
-            </a:extLst>
-          </p:cNvPr>
-          <p:cNvSpPr/>
-          <p:nvPr/>
-        </p:nvSpPr>
-        <p:spPr>
-          <a:xfrm>
-            <a:off x="3085527" y="4773096"/>
-            <a:ext cx="2386083" cy="1247604"/>
-          </a:xfrm>
-          <a:prstGeom prst="roundRect">
-            <a:avLst/>
-          </a:prstGeom>
-        </p:spPr>
-        <p:style>
-          <a:lnRef idx="2">
-            <a:schemeClr val="accent3"/>
-          </a:lnRef>
-          <a:fillRef idx="1">
-            <a:schemeClr val="lt1"/>
-          </a:fillRef>
-          <a:effectRef idx="0">
-            <a:schemeClr val="accent3"/>
-          </a:effectRef>
-          <a:fontRef idx="minor">
-            <a:schemeClr val="dk1"/>
-          </a:fontRef>
-        </p:style>
-        <p:txBody>
-          <a:bodyPr rtlCol="0" anchor="ctr"/>
-          <a:lstStyle/>
-          <a:p>
-            <a:pPr marL="285750" indent="-285750">
-              <a:buFont typeface="Arial" panose="020B0604020202020204" pitchFamily="34" charset="0"/>
-              <a:buChar char="•"/>
-            </a:pPr>
-            <a:r>
-              <a:rPr lang="en-US" sz="1600" dirty="0"/>
-              <a:t>Find all scenarios</a:t>
-            </a:r>
-          </a:p>
-          <a:p>
-            <a:pPr marL="285750" indent="-285750">
-              <a:buFont typeface="Arial" panose="020B0604020202020204" pitchFamily="34" charset="0"/>
-              <a:buChar char="•"/>
-            </a:pPr>
-            <a:r>
-              <a:rPr lang="en-US" sz="1600" dirty="0"/>
-              <a:t>Find all params</a:t>
-            </a:r>
-          </a:p>
-          <a:p>
-            <a:pPr marL="285750" indent="-285750">
-              <a:buFont typeface="Arial" panose="020B0604020202020204" pitchFamily="34" charset="0"/>
-              <a:buChar char="•"/>
-            </a:pPr>
-            <a:r>
-              <a:rPr lang="en-US" sz="1600" dirty="0"/>
-              <a:t>Find all class 2</a:t>
-            </a:r>
-          </a:p>
-        </p:txBody>
-      </p:sp>
-      <p:sp>
-        <p:nvSpPr>
-          <p:cNvPr id="37" name="Rectangle: Rounded Corners 36">
-            <a:extLst>
-              <a:ext uri="{FF2B5EF4-FFF2-40B4-BE49-F238E27FC236}">
-                <a16:creationId xmlns:a16="http://schemas.microsoft.com/office/drawing/2014/main" id="{1BE9E735-2CF3-08EB-91DE-79DB9BE326A6}"/>
-              </a:ext>
-            </a:extLst>
-          </p:cNvPr>
-          <p:cNvSpPr/>
-          <p:nvPr/>
-        </p:nvSpPr>
-        <p:spPr>
-          <a:xfrm>
-            <a:off x="5778544" y="2322458"/>
-            <a:ext cx="1810651" cy="1514171"/>
-          </a:xfrm>
-          <a:prstGeom prst="roundRect">
-            <a:avLst/>
-          </a:prstGeom>
-        </p:spPr>
-        <p:style>
-          <a:lnRef idx="2">
-            <a:schemeClr val="accent1">
-              <a:shade val="50000"/>
-            </a:schemeClr>
-          </a:lnRef>
-          <a:fillRef idx="1">
-            <a:schemeClr val="accent1"/>
-          </a:fillRef>
-          <a:effectRef idx="0">
-            <a:schemeClr val="accent1"/>
-          </a:effectRef>
-          <a:fontRef idx="minor">
-            <a:schemeClr val="lt1"/>
-          </a:fontRef>
-        </p:style>
-        <p:txBody>
-          <a:bodyPr rtlCol="0" anchor="ctr"/>
-          <a:lstStyle/>
-          <a:p>
-            <a:pPr algn="ctr"/>
-            <a:r>
-              <a:rPr lang="en-US" dirty="0"/>
-              <a:t>Param</a:t>
-            </a:r>
-          </a:p>
-          <a:p>
-            <a:pPr algn="ctr"/>
-            <a:r>
-              <a:rPr lang="en-US" dirty="0"/>
-              <a:t>- </a:t>
-            </a:r>
-            <a:r>
-              <a:rPr lang="en-US" dirty="0" err="1"/>
-              <a:t>param_id</a:t>
-            </a:r>
-            <a:endParaRPr lang="en-US" dirty="0"/>
-          </a:p>
-          <a:p>
-            <a:pPr marL="285750" indent="-285750" algn="ctr">
-              <a:buFontTx/>
-              <a:buChar char="-"/>
-            </a:pPr>
-            <a:r>
-              <a:rPr lang="en-US" dirty="0"/>
-              <a:t>Name</a:t>
-            </a:r>
-          </a:p>
-          <a:p>
-            <a:pPr marL="285750" indent="-285750" algn="ctr">
-              <a:buFontTx/>
-              <a:buChar char="-"/>
-            </a:pPr>
-            <a:r>
-              <a:rPr lang="en-US" dirty="0"/>
-              <a:t>Units</a:t>
-            </a:r>
-          </a:p>
-          <a:p>
-            <a:pPr marL="285750" indent="-285750" algn="ctr">
-              <a:buFontTx/>
-              <a:buChar char="-"/>
-            </a:pPr>
-            <a:r>
-              <a:rPr lang="en-US" dirty="0"/>
-              <a:t>value</a:t>
-            </a:r>
-          </a:p>
-        </p:txBody>
-      </p:sp>
-    </p:spTree>
-    <p:extLst>
-      <p:ext uri="{BB962C8B-B14F-4D97-AF65-F5344CB8AC3E}">
-        <p14:creationId xmlns:p14="http://schemas.microsoft.com/office/powerpoint/2010/main" val="3690257771"/>
-      </p:ext>
-    </p:extLst>
-  </p:cSld>
-  <p:clrMapOvr>
-    <a:masterClrMapping/>
-  </p:clrMapOvr>
-</p:sld>
-</file>
-
-<file path=ppt/slides/slide9.xml><?xml version="1.0" encoding="utf-8"?>
-<p:sld xmlns:a="http://schemas.openxmlformats.org/drawingml/2006/main" xmlns:r="http://schemas.openxmlformats.org/officeDocument/2006/relationships" xmlns:p="http://schemas.openxmlformats.org/presentationml/2006/main">
-  <p:cSld>
-    <p:spTree>
-      <p:nvGrpSpPr>
-        <p:cNvPr id="1" name=""/>
-        <p:cNvGrpSpPr/>
-        <p:nvPr/>
-      </p:nvGrpSpPr>
-      <p:grpSpPr>
-        <a:xfrm>
-          <a:off x="0" y="0"/>
-          <a:ext cx="0" cy="0"/>
-          <a:chOff x="0" y="0"/>
-          <a:chExt cx="0" cy="0"/>
-        </a:xfrm>
-      </p:grpSpPr>
-      <p:sp>
-        <p:nvSpPr>
-          <p:cNvPr id="2" name="Title 1">
-            <a:extLst>
-              <a:ext uri="{FF2B5EF4-FFF2-40B4-BE49-F238E27FC236}">
-                <a16:creationId xmlns:a16="http://schemas.microsoft.com/office/drawing/2014/main" id="{2C2320FF-FB20-7AC2-5593-F6B8081422F3}"/>
-              </a:ext>
-            </a:extLst>
-          </p:cNvPr>
-          <p:cNvSpPr>
-            <a:spLocks noGrp="1"/>
-          </p:cNvSpPr>
-          <p:nvPr>
-            <p:ph type="title"/>
-          </p:nvPr>
-        </p:nvSpPr>
-        <p:spPr/>
-        <p:txBody>
-          <a:bodyPr/>
-          <a:lstStyle/>
-          <a:p>
-            <a:r>
-              <a:rPr lang="en-US" dirty="0"/>
-              <a:t>4 Primary Key</a:t>
-            </a:r>
-          </a:p>
-        </p:txBody>
-      </p:sp>
-      <p:graphicFrame>
-        <p:nvGraphicFramePr>
-          <p:cNvPr id="4" name="Table 16">
-            <a:extLst>
-              <a:ext uri="{FF2B5EF4-FFF2-40B4-BE49-F238E27FC236}">
-                <a16:creationId xmlns:a16="http://schemas.microsoft.com/office/drawing/2014/main" id="{B1C6CC05-9377-C30D-C153-70828B044B97}"/>
-              </a:ext>
-            </a:extLst>
-          </p:cNvPr>
-          <p:cNvGraphicFramePr>
-            <a:graphicFrameLocks noGrp="1"/>
-          </p:cNvGraphicFramePr>
-          <p:nvPr>
-            <p:extLst>
-              <p:ext uri="{D42A27DB-BD31-4B8C-83A1-F6EECF244321}">
-                <p14:modId xmlns:p14="http://schemas.microsoft.com/office/powerpoint/2010/main" val="3367607023"/>
-              </p:ext>
-            </p:extLst>
-          </p:nvPr>
-        </p:nvGraphicFramePr>
-        <p:xfrm>
-          <a:off x="1975029" y="2220123"/>
-          <a:ext cx="7951752" cy="3661836"/>
-        </p:xfrm>
-        <a:graphic>
-          <a:graphicData uri="http://schemas.openxmlformats.org/drawingml/2006/table">
-            <a:tbl>
-              <a:tblPr firstRow="1" bandRow="1">
-                <a:tableStyleId>{5C22544A-7EE6-4342-B048-85BDC9FD1C3A}</a:tableStyleId>
-              </a:tblPr>
-              <a:tblGrid>
-                <a:gridCol w="2650584">
-                  <a:extLst>
-                    <a:ext uri="{9D8B030D-6E8A-4147-A177-3AD203B41FA5}">
-                      <a16:colId xmlns:a16="http://schemas.microsoft.com/office/drawing/2014/main" val="1558971779"/>
-                    </a:ext>
-                  </a:extLst>
-                </a:gridCol>
-                <a:gridCol w="2650584">
-                  <a:extLst>
-                    <a:ext uri="{9D8B030D-6E8A-4147-A177-3AD203B41FA5}">
-                      <a16:colId xmlns:a16="http://schemas.microsoft.com/office/drawing/2014/main" val="2800269369"/>
-                    </a:ext>
-                  </a:extLst>
-                </a:gridCol>
-                <a:gridCol w="2650584">
-                  <a:extLst>
-                    <a:ext uri="{9D8B030D-6E8A-4147-A177-3AD203B41FA5}">
-                      <a16:colId xmlns:a16="http://schemas.microsoft.com/office/drawing/2014/main" val="997523949"/>
-                    </a:ext>
-                  </a:extLst>
-                </a:gridCol>
-              </a:tblGrid>
-              <a:tr h="610306">
-                <a:tc>
-                  <a:txBody>
-                    <a:bodyPr/>
-                    <a:lstStyle/>
-                    <a:p>
-                      <a:r>
-                        <a:rPr lang="en-US" dirty="0"/>
-                        <a:t>Entity</a:t>
-                      </a:r>
-                    </a:p>
-                  </a:txBody>
-                  <a:tcPr/>
-                </a:tc>
-                <a:tc>
-                  <a:txBody>
-                    <a:bodyPr/>
-                    <a:lstStyle/>
-                    <a:p>
-                      <a:r>
-                        <a:rPr lang="en-US" dirty="0"/>
-                        <a:t>Partition Key (PK)</a:t>
-                      </a:r>
-                    </a:p>
-                  </a:txBody>
-                  <a:tcPr/>
-                </a:tc>
-                <a:tc>
-                  <a:txBody>
-                    <a:bodyPr/>
-                    <a:lstStyle/>
-                    <a:p>
-                      <a:r>
-                        <a:rPr lang="en-US" dirty="0"/>
-                        <a:t>Sort Key (SK)</a:t>
-                      </a:r>
-                    </a:p>
-                  </a:txBody>
-                  <a:tcPr/>
-                </a:tc>
-                <a:extLst>
-                  <a:ext uri="{0D108BD9-81ED-4DB2-BD59-A6C34878D82A}">
-                    <a16:rowId xmlns:a16="http://schemas.microsoft.com/office/drawing/2014/main" val="1490163295"/>
-                  </a:ext>
-                </a:extLst>
-              </a:tr>
-              <a:tr h="610306">
-                <a:tc>
-                  <a:txBody>
-                    <a:bodyPr/>
-                    <a:lstStyle/>
-                    <a:p>
-                      <a:r>
-                        <a:rPr lang="en-US" dirty="0"/>
-                        <a:t>Region</a:t>
-                      </a:r>
-                    </a:p>
-                  </a:txBody>
-                  <a:tcPr/>
-                </a:tc>
-                <a:tc>
-                  <a:txBody>
-                    <a:bodyPr/>
-                    <a:lstStyle/>
-                    <a:p>
-                      <a:r>
-                        <a:rPr lang="en-US" dirty="0"/>
-                        <a:t>REG#&lt;reg-id&gt;</a:t>
-                      </a:r>
-                    </a:p>
-                  </a:txBody>
-                  <a:tcPr/>
-                </a:tc>
-                <a:tc>
-                  <a:txBody>
-                    <a:bodyPr/>
-                    <a:lstStyle/>
-                    <a:p>
-                      <a:endParaRPr lang="en-US" dirty="0"/>
-                    </a:p>
-                  </a:txBody>
-                  <a:tcPr/>
-                </a:tc>
-                <a:extLst>
-                  <a:ext uri="{0D108BD9-81ED-4DB2-BD59-A6C34878D82A}">
-                    <a16:rowId xmlns:a16="http://schemas.microsoft.com/office/drawing/2014/main" val="144224010"/>
-                  </a:ext>
-                </a:extLst>
-              </a:tr>
-              <a:tr h="610306">
-                <a:tc>
-                  <a:txBody>
-                    <a:bodyPr/>
-                    <a:lstStyle/>
-                    <a:p>
-                      <a:r>
-                        <a:rPr lang="en-US" dirty="0"/>
-                        <a:t>Scenario</a:t>
-                      </a:r>
-                    </a:p>
-                  </a:txBody>
-                  <a:tcPr/>
-                </a:tc>
-                <a:tc>
-                  <a:txBody>
-                    <a:bodyPr/>
-                    <a:lstStyle/>
-                    <a:p>
-                      <a:pPr marL="0" marR="0" lvl="0" indent="0" algn="l" defTabSz="914400" rtl="0" eaLnBrk="1" fontAlgn="auto" latinLnBrk="0" hangingPunct="1">
-                        <a:lnSpc>
-                          <a:spcPct val="100000"/>
-                        </a:lnSpc>
-                        <a:spcBef>
-                          <a:spcPts val="0"/>
-                        </a:spcBef>
-                        <a:spcAft>
-                          <a:spcPts val="0"/>
-                        </a:spcAft>
-                        <a:buClrTx/>
-                        <a:buSzTx/>
-                        <a:buFontTx/>
-                        <a:buNone/>
-                        <a:tabLst/>
-                        <a:defRPr/>
-                      </a:pPr>
-                      <a:r>
-                        <a:rPr lang="en-US" dirty="0"/>
-                        <a:t>REG#&lt;reg-id&gt;</a:t>
-                      </a:r>
-                    </a:p>
-                  </a:txBody>
-                  <a:tcPr/>
-                </a:tc>
-                <a:tc>
-                  <a:txBody>
-                    <a:bodyPr/>
-                    <a:lstStyle/>
-                    <a:p>
-                      <a:r>
-                        <a:rPr lang="en-US" dirty="0"/>
-                        <a:t>SCE#&lt;type&gt;#&lt;scen-id&gt;</a:t>
-                      </a:r>
-                    </a:p>
-                  </a:txBody>
-                  <a:tcPr/>
-                </a:tc>
-                <a:extLst>
-                  <a:ext uri="{0D108BD9-81ED-4DB2-BD59-A6C34878D82A}">
-                    <a16:rowId xmlns:a16="http://schemas.microsoft.com/office/drawing/2014/main" val="1592972635"/>
-                  </a:ext>
-                </a:extLst>
-              </a:tr>
-              <a:tr h="610306">
-                <a:tc>
-                  <a:txBody>
-                    <a:bodyPr/>
-                    <a:lstStyle/>
-                    <a:p>
-                      <a:r>
-                        <a:rPr lang="en-US" dirty="0"/>
-                        <a:t>Param</a:t>
-                      </a:r>
-                    </a:p>
-                  </a:txBody>
-                  <a:tcPr/>
-                </a:tc>
-                <a:tc>
-                  <a:txBody>
-                    <a:bodyPr/>
-                    <a:lstStyle/>
-                    <a:p>
-                      <a:pPr marL="0" marR="0" lvl="0" indent="0" algn="l" defTabSz="914400" rtl="0" eaLnBrk="1" fontAlgn="auto" latinLnBrk="0" hangingPunct="1">
-                        <a:lnSpc>
-                          <a:spcPct val="100000"/>
-                        </a:lnSpc>
-                        <a:spcBef>
-                          <a:spcPts val="0"/>
-                        </a:spcBef>
-                        <a:spcAft>
-                          <a:spcPts val="0"/>
-                        </a:spcAft>
-                        <a:buClrTx/>
-                        <a:buSzTx/>
-                        <a:buFontTx/>
-                        <a:buNone/>
-                        <a:tabLst/>
-                        <a:defRPr/>
-                      </a:pPr>
-                      <a:r>
-                        <a:rPr lang="en-US" dirty="0"/>
-                        <a:t>REG#&lt;reg-id&gt;</a:t>
-                      </a:r>
-                    </a:p>
-                  </a:txBody>
-                  <a:tcPr/>
-                </a:tc>
-                <a:tc>
-                  <a:txBody>
-                    <a:bodyPr/>
-                    <a:lstStyle/>
-                    <a:p>
-                      <a:r>
-                        <a:rPr lang="en-US" dirty="0"/>
-                        <a:t>PAR#</a:t>
-                      </a:r>
-                    </a:p>
-                  </a:txBody>
-                  <a:tcPr/>
-                </a:tc>
-                <a:extLst>
-                  <a:ext uri="{0D108BD9-81ED-4DB2-BD59-A6C34878D82A}">
-                    <a16:rowId xmlns:a16="http://schemas.microsoft.com/office/drawing/2014/main" val="3881365903"/>
-                  </a:ext>
-                </a:extLst>
-              </a:tr>
-              <a:tr h="610306">
-                <a:tc>
-                  <a:txBody>
-                    <a:bodyPr/>
-                    <a:lstStyle/>
-                    <a:p>
-                      <a:r>
-                        <a:rPr lang="en-US" dirty="0"/>
-                        <a:t>Class 1</a:t>
-                      </a:r>
-                    </a:p>
-                  </a:txBody>
-                  <a:tcPr/>
-                </a:tc>
-                <a:tc>
-                  <a:txBody>
-                    <a:bodyPr/>
-                    <a:lstStyle/>
-                    <a:p>
-                      <a:pPr marL="0" marR="0" lvl="0" indent="0" algn="l" defTabSz="914400" rtl="0" eaLnBrk="1" fontAlgn="auto" latinLnBrk="0" hangingPunct="1">
-                        <a:lnSpc>
-                          <a:spcPct val="100000"/>
-                        </a:lnSpc>
-                        <a:spcBef>
-                          <a:spcPts val="0"/>
-                        </a:spcBef>
-                        <a:spcAft>
-                          <a:spcPts val="0"/>
-                        </a:spcAft>
-                        <a:buClrTx/>
-                        <a:buSzTx/>
-                        <a:buFontTx/>
-                        <a:buNone/>
-                        <a:tabLst/>
-                        <a:defRPr/>
-                      </a:pPr>
-                      <a:r>
-                        <a:rPr lang="en-US" dirty="0"/>
-                        <a:t>REG#&lt;reg-id&gt;</a:t>
-                      </a:r>
-                    </a:p>
-                  </a:txBody>
-                  <a:tcPr/>
-                </a:tc>
-                <a:tc>
-                  <a:txBody>
-                    <a:bodyPr/>
-                    <a:lstStyle/>
-                    <a:p>
-                      <a:endParaRPr lang="en-US" dirty="0"/>
-                    </a:p>
-                  </a:txBody>
-                  <a:tcPr/>
-                </a:tc>
-                <a:extLst>
-                  <a:ext uri="{0D108BD9-81ED-4DB2-BD59-A6C34878D82A}">
-                    <a16:rowId xmlns:a16="http://schemas.microsoft.com/office/drawing/2014/main" val="588450801"/>
-                  </a:ext>
-                </a:extLst>
-              </a:tr>
-              <a:tr h="610306">
-                <a:tc>
-                  <a:txBody>
-                    <a:bodyPr/>
-                    <a:lstStyle/>
-                    <a:p>
-                      <a:r>
-                        <a:rPr lang="en-US" dirty="0"/>
-                        <a:t>Class 2</a:t>
-                      </a:r>
-                    </a:p>
-                  </a:txBody>
-                  <a:tcPr/>
-                </a:tc>
-                <a:tc>
-                  <a:txBody>
-                    <a:bodyPr/>
-                    <a:lstStyle/>
-                    <a:p>
-                      <a:pPr marL="0" marR="0" lvl="0" indent="0" algn="l" defTabSz="914400" rtl="0" eaLnBrk="1" fontAlgn="auto" latinLnBrk="0" hangingPunct="1">
-                        <a:lnSpc>
-                          <a:spcPct val="100000"/>
-                        </a:lnSpc>
-                        <a:spcBef>
-                          <a:spcPts val="0"/>
-                        </a:spcBef>
-                        <a:spcAft>
-                          <a:spcPts val="0"/>
-                        </a:spcAft>
-                        <a:buClrTx/>
-                        <a:buSzTx/>
-                        <a:buFontTx/>
-                        <a:buNone/>
-                        <a:tabLst/>
-                        <a:defRPr/>
-                      </a:pPr>
-                      <a:r>
-                        <a:rPr lang="en-US" dirty="0"/>
-                        <a:t>REG#&lt;reg-id&gt;</a:t>
-                      </a:r>
-                    </a:p>
-                  </a:txBody>
-                  <a:tcPr/>
-                </a:tc>
-                <a:tc>
-                  <a:txBody>
-                    <a:bodyPr/>
-                    <a:lstStyle/>
-                    <a:p>
-                      <a:endParaRPr lang="en-US" dirty="0"/>
-                    </a:p>
-                  </a:txBody>
-                  <a:tcPr/>
-                </a:tc>
-                <a:extLst>
-                  <a:ext uri="{0D108BD9-81ED-4DB2-BD59-A6C34878D82A}">
-                    <a16:rowId xmlns:a16="http://schemas.microsoft.com/office/drawing/2014/main" val="3359421690"/>
-                  </a:ext>
-                </a:extLst>
-              </a:tr>
-            </a:tbl>
-          </a:graphicData>
-        </a:graphic>
-      </p:graphicFrame>
-    </p:spTree>
-    <p:extLst>
-      <p:ext uri="{BB962C8B-B14F-4D97-AF65-F5344CB8AC3E}">
-        <p14:creationId xmlns:p14="http://schemas.microsoft.com/office/powerpoint/2010/main" val="2196138761"/>
       </p:ext>
     </p:extLst>
   </p:cSld>

</xml_diff>